<commit_message>
updating user manual figures
</commit_message>
<xml_diff>
--- a/docs/User Guide Block Diagrams.pptx
+++ b/docs/User Guide Block Diagrams.pptx
@@ -6,6 +6,7 @@
   </p:sldMasterIdLst>
   <p:sldIdLst>
     <p:sldId id="256" r:id="rId2"/>
+    <p:sldId id="257" r:id="rId3"/>
   </p:sldIdLst>
   <p:sldSz cx="12192000" cy="6858000"/>
   <p:notesSz cx="6858000" cy="9144000"/>
@@ -2966,7 +2967,7 @@
       </p:grpSpPr>
       <p:grpSp>
         <p:nvGrpSpPr>
-          <p:cNvPr id="289" name="Group 288"/>
+          <p:cNvPr id="301" name="Group 300"/>
           <p:cNvGrpSpPr/>
           <p:nvPr/>
         </p:nvGrpSpPr>
@@ -2974,19 +2975,59 @@
           <a:xfrm>
             <a:off x="617637" y="999907"/>
             <a:ext cx="10719973" cy="4099811"/>
-            <a:chOff x="196532" y="326139"/>
+            <a:chOff x="617637" y="999907"/>
             <a:chExt cx="10719973" cy="4099811"/>
           </a:xfrm>
         </p:grpSpPr>
         <p:sp>
           <p:nvSpPr>
+            <p:cNvPr id="290" name="Rectangle 289"/>
+            <p:cNvSpPr/>
+            <p:nvPr/>
+          </p:nvSpPr>
+          <p:spPr>
+            <a:xfrm>
+              <a:off x="10901116" y="4226964"/>
+              <a:ext cx="117592" cy="106626"/>
+            </a:xfrm>
+            <a:prstGeom prst="rect">
+              <a:avLst/>
+            </a:prstGeom>
+          </p:spPr>
+          <p:style>
+            <a:lnRef idx="2">
+              <a:schemeClr val="accent1">
+                <a:shade val="50000"/>
+              </a:schemeClr>
+            </a:lnRef>
+            <a:fillRef idx="1">
+              <a:schemeClr val="accent1"/>
+            </a:fillRef>
+            <a:effectRef idx="0">
+              <a:schemeClr val="accent1"/>
+            </a:effectRef>
+            <a:fontRef idx="minor">
+              <a:schemeClr val="lt1"/>
+            </a:fontRef>
+          </p:style>
+          <p:txBody>
+            <a:bodyPr rtlCol="0" anchor="ctr"/>
+            <a:lstStyle/>
+            <a:p>
+              <a:pPr algn="ctr"/>
+              <a:endParaRPr lang="en-US"/>
+            </a:p>
+          </p:txBody>
+        </p:sp>
+        <p:sp>
+          <p:nvSpPr>
             <p:cNvPr id="252" name="Rectangle 251"/>
             <p:cNvSpPr/>
             <p:nvPr/>
           </p:nvSpPr>
           <p:spPr>
             <a:xfrm>
-              <a:off x="5195474" y="3557002"/>
+              <a:off x="5616579" y="4230770"/>
               <a:ext cx="90488" cy="95835"/>
             </a:xfrm>
             <a:prstGeom prst="rect">
@@ -3026,7 +3067,7 @@
           </p:nvSpPr>
           <p:spPr>
             <a:xfrm>
-              <a:off x="4427700" y="3559589"/>
+              <a:off x="4848805" y="4233357"/>
               <a:ext cx="90488" cy="95835"/>
             </a:xfrm>
             <a:prstGeom prst="rect">
@@ -3066,7 +3107,7 @@
           </p:nvSpPr>
           <p:spPr>
             <a:xfrm>
-              <a:off x="661793" y="1967266"/>
+              <a:off x="1082898" y="2641034"/>
               <a:ext cx="90488" cy="95835"/>
             </a:xfrm>
             <a:prstGeom prst="rect">
@@ -3106,7 +3147,7 @@
           </p:nvSpPr>
           <p:spPr>
             <a:xfrm>
-              <a:off x="10490629" y="1963326"/>
+              <a:off x="10911734" y="2637094"/>
               <a:ext cx="90488" cy="95835"/>
             </a:xfrm>
             <a:prstGeom prst="rect">
@@ -3146,7 +3187,7 @@
           </p:nvSpPr>
           <p:spPr>
             <a:xfrm>
-              <a:off x="9629250" y="3562350"/>
+              <a:off x="10050355" y="4236118"/>
               <a:ext cx="90488" cy="95835"/>
             </a:xfrm>
             <a:prstGeom prst="rect">
@@ -3186,7 +3227,7 @@
           </p:nvSpPr>
           <p:spPr>
             <a:xfrm>
-              <a:off x="6256830" y="3565878"/>
+              <a:off x="6677935" y="4239646"/>
               <a:ext cx="90488" cy="95835"/>
             </a:xfrm>
             <a:prstGeom prst="rect">
@@ -3226,7 +3267,7 @@
           </p:nvSpPr>
           <p:spPr>
             <a:xfrm>
-              <a:off x="3922655" y="3565878"/>
+              <a:off x="4343760" y="4239646"/>
               <a:ext cx="90488" cy="95835"/>
             </a:xfrm>
             <a:prstGeom prst="rect">
@@ -3266,7 +3307,7 @@
           </p:nvSpPr>
           <p:spPr>
             <a:xfrm>
-              <a:off x="1190826" y="792860"/>
+              <a:off x="1611931" y="1466628"/>
               <a:ext cx="8994037" cy="1827663"/>
             </a:xfrm>
             <a:prstGeom prst="rect">
@@ -3314,7 +3355,7 @@
           </p:nvSpPr>
           <p:spPr>
             <a:xfrm>
-              <a:off x="1102917" y="701955"/>
+              <a:off x="1524022" y="1375723"/>
               <a:ext cx="8994037" cy="1827663"/>
             </a:xfrm>
             <a:prstGeom prst="rect">
@@ -3362,7 +3403,7 @@
           </p:nvSpPr>
           <p:spPr>
             <a:xfrm>
-              <a:off x="1226520" y="1472849"/>
+              <a:off x="1647625" y="2146617"/>
               <a:ext cx="2975948" cy="843181"/>
             </a:xfrm>
             <a:prstGeom prst="rect">
@@ -3413,7 +3454,7 @@
           </p:nvCxnSpPr>
           <p:spPr>
             <a:xfrm>
-              <a:off x="973165" y="1894440"/>
+              <a:off x="1394270" y="2568208"/>
               <a:ext cx="349424" cy="0"/>
             </a:xfrm>
             <a:prstGeom prst="line">
@@ -3451,7 +3492,7 @@
           </p:nvCxnSpPr>
           <p:spPr>
             <a:xfrm>
-              <a:off x="1697338" y="1894440"/>
+              <a:off x="2118443" y="2568208"/>
               <a:ext cx="162515" cy="0"/>
             </a:xfrm>
             <a:prstGeom prst="line">
@@ -3489,7 +3530,7 @@
           </p:nvCxnSpPr>
           <p:spPr>
             <a:xfrm>
-              <a:off x="2358687" y="1894440"/>
+              <a:off x="2779792" y="2568208"/>
               <a:ext cx="207757" cy="1"/>
             </a:xfrm>
             <a:prstGeom prst="line">
@@ -3527,7 +3568,7 @@
           </p:nvCxnSpPr>
           <p:spPr>
             <a:xfrm flipV="1">
-              <a:off x="2892556" y="1894440"/>
+              <a:off x="3313661" y="2568208"/>
               <a:ext cx="154863" cy="1"/>
             </a:xfrm>
             <a:prstGeom prst="line">
@@ -3564,7 +3605,7 @@
           </p:nvCxnSpPr>
           <p:spPr>
             <a:xfrm>
-              <a:off x="3546253" y="1894440"/>
+              <a:off x="3967358" y="2568208"/>
               <a:ext cx="237206" cy="1"/>
             </a:xfrm>
             <a:prstGeom prst="line">
@@ -3601,7 +3642,7 @@
           </p:nvCxnSpPr>
           <p:spPr>
             <a:xfrm flipV="1">
-              <a:off x="4109571" y="1894440"/>
+              <a:off x="4530676" y="2568208"/>
               <a:ext cx="92896" cy="2"/>
             </a:xfrm>
             <a:prstGeom prst="line">
@@ -3636,7 +3677,7 @@
           </p:nvGrpSpPr>
           <p:grpSpPr>
             <a:xfrm>
-              <a:off x="333799" y="1444370"/>
+              <a:off x="754904" y="2118138"/>
               <a:ext cx="639366" cy="623668"/>
               <a:chOff x="533849" y="1260353"/>
               <a:chExt cx="774344" cy="755331"/>
@@ -3729,7 +3770,7 @@
           </p:nvGrpSpPr>
           <p:grpSpPr>
             <a:xfrm>
-              <a:off x="1278865" y="1444370"/>
+              <a:off x="1699970" y="2118138"/>
               <a:ext cx="516488" cy="637444"/>
               <a:chOff x="1478380" y="1260353"/>
               <a:chExt cx="625525" cy="772016"/>
@@ -3832,7 +3873,7 @@
           </p:nvGrpSpPr>
           <p:grpSpPr>
             <a:xfrm>
-              <a:off x="1859853" y="1444370"/>
+              <a:off x="2280958" y="2118138"/>
               <a:ext cx="518980" cy="623668"/>
               <a:chOff x="2182021" y="1260353"/>
               <a:chExt cx="628543" cy="755332"/>
@@ -4072,7 +4113,7 @@
           </p:nvGrpSpPr>
           <p:grpSpPr>
             <a:xfrm>
-              <a:off x="2554802" y="1444370"/>
+              <a:off x="2975907" y="2118138"/>
               <a:ext cx="393954" cy="623668"/>
               <a:chOff x="3023682" y="1260353"/>
               <a:chExt cx="477122" cy="755331"/>
@@ -4163,7 +4204,7 @@
           </p:nvGrpSpPr>
           <p:grpSpPr>
             <a:xfrm>
-              <a:off x="3048677" y="1444370"/>
+              <a:off x="3469782" y="2118138"/>
               <a:ext cx="518980" cy="623668"/>
               <a:chOff x="2182021" y="1260353"/>
               <a:chExt cx="628543" cy="755332"/>
@@ -4403,7 +4444,7 @@
           </p:nvGrpSpPr>
           <p:grpSpPr>
             <a:xfrm>
-              <a:off x="3776300" y="1444370"/>
+              <a:off x="4197405" y="2118138"/>
               <a:ext cx="393954" cy="623668"/>
               <a:chOff x="3023682" y="1260353"/>
               <a:chExt cx="477122" cy="755331"/>
@@ -4494,7 +4535,7 @@
           </p:nvSpPr>
           <p:spPr>
             <a:xfrm>
-              <a:off x="4422878" y="1621644"/>
+              <a:off x="4843983" y="2295412"/>
               <a:ext cx="853520" cy="545591"/>
             </a:xfrm>
             <a:prstGeom prst="rect">
@@ -4540,7 +4581,7 @@
           </p:nvSpPr>
           <p:spPr>
             <a:xfrm>
-              <a:off x="4738082" y="1875563"/>
+              <a:off x="5159187" y="2549331"/>
               <a:ext cx="37750" cy="37750"/>
             </a:xfrm>
             <a:prstGeom prst="ellipse">
@@ -4589,7 +4630,7 @@
           </p:nvCxnSpPr>
           <p:spPr>
             <a:xfrm>
-              <a:off x="4202468" y="1894440"/>
+              <a:off x="4623573" y="2568208"/>
               <a:ext cx="220410" cy="0"/>
             </a:xfrm>
             <a:prstGeom prst="line">
@@ -4624,7 +4665,7 @@
           </p:nvSpPr>
           <p:spPr>
             <a:xfrm>
-              <a:off x="4923443" y="1875562"/>
+              <a:off x="5344548" y="2549330"/>
               <a:ext cx="37750" cy="37750"/>
             </a:xfrm>
             <a:prstGeom prst="ellipse">
@@ -4673,7 +4714,7 @@
           </p:nvCxnSpPr>
           <p:spPr>
             <a:xfrm flipV="1">
-              <a:off x="4422878" y="1894438"/>
+              <a:off x="4843983" y="2568206"/>
               <a:ext cx="315204" cy="2"/>
             </a:xfrm>
             <a:prstGeom prst="line">
@@ -4711,7 +4752,7 @@
           </p:nvCxnSpPr>
           <p:spPr>
             <a:xfrm>
-              <a:off x="4961193" y="1894437"/>
+              <a:off x="5382298" y="2568205"/>
               <a:ext cx="315205" cy="2"/>
             </a:xfrm>
             <a:prstGeom prst="line">
@@ -4748,7 +4789,7 @@
           </p:nvCxnSpPr>
           <p:spPr>
             <a:xfrm>
-              <a:off x="4849638" y="1621644"/>
+              <a:off x="5270743" y="2295412"/>
               <a:ext cx="0" cy="99198"/>
             </a:xfrm>
             <a:prstGeom prst="line">
@@ -4785,7 +4826,7 @@
           </p:nvCxnSpPr>
           <p:spPr>
             <a:xfrm flipH="1">
-              <a:off x="4804099" y="1720842"/>
+              <a:off x="5225204" y="2394610"/>
               <a:ext cx="45539" cy="91063"/>
             </a:xfrm>
             <a:prstGeom prst="line">
@@ -4820,7 +4861,7 @@
           </p:nvSpPr>
           <p:spPr>
             <a:xfrm>
-              <a:off x="4771878" y="1806378"/>
+              <a:off x="5192983" y="2480146"/>
               <a:ext cx="37750" cy="37750"/>
             </a:xfrm>
             <a:prstGeom prst="ellipse">
@@ -4866,7 +4907,7 @@
           </p:nvSpPr>
           <p:spPr>
             <a:xfrm>
-              <a:off x="4358247" y="1874535"/>
+              <a:off x="4779352" y="2548303"/>
               <a:ext cx="1008738" cy="338554"/>
             </a:xfrm>
             <a:prstGeom prst="rect">
@@ -4896,7 +4937,7 @@
           </p:nvSpPr>
           <p:spPr>
             <a:xfrm rot="10800000">
-              <a:off x="4705175" y="973902"/>
+              <a:off x="5126280" y="1647670"/>
               <a:ext cx="288925" cy="249074"/>
             </a:xfrm>
             <a:prstGeom prst="triangle">
@@ -4945,7 +4986,7 @@
           </p:nvCxnSpPr>
           <p:spPr>
             <a:xfrm>
-              <a:off x="4849637" y="1222976"/>
+              <a:off x="5270742" y="1896744"/>
               <a:ext cx="1" cy="398668"/>
             </a:xfrm>
             <a:prstGeom prst="line">
@@ -4980,7 +5021,7 @@
           </p:nvSpPr>
           <p:spPr>
             <a:xfrm>
-              <a:off x="4581775" y="701955"/>
+              <a:off x="5002880" y="1375723"/>
               <a:ext cx="535724" cy="338554"/>
             </a:xfrm>
             <a:prstGeom prst="rect">
@@ -5010,7 +5051,7 @@
           </p:nvSpPr>
           <p:spPr>
             <a:xfrm>
-              <a:off x="2287154" y="1139417"/>
+              <a:off x="2708259" y="1813185"/>
               <a:ext cx="1000595" cy="369332"/>
             </a:xfrm>
             <a:prstGeom prst="rect">
@@ -5040,7 +5081,7 @@
           </p:nvSpPr>
           <p:spPr>
             <a:xfrm>
-              <a:off x="5484903" y="1472846"/>
+              <a:off x="5906008" y="2146614"/>
               <a:ext cx="4490153" cy="843181"/>
             </a:xfrm>
             <a:prstGeom prst="rect">
@@ -5091,7 +5132,7 @@
           </p:nvCxnSpPr>
           <p:spPr>
             <a:xfrm flipV="1">
-              <a:off x="5276398" y="1894437"/>
+              <a:off x="5697503" y="2568205"/>
               <a:ext cx="208505" cy="3"/>
             </a:xfrm>
             <a:prstGeom prst="line">
@@ -5126,7 +5167,7 @@
           </p:nvGrpSpPr>
           <p:grpSpPr>
             <a:xfrm>
-              <a:off x="5501126" y="1452367"/>
+              <a:off x="5922231" y="2126135"/>
               <a:ext cx="522900" cy="615970"/>
               <a:chOff x="2918112" y="1269676"/>
               <a:chExt cx="633290" cy="746008"/>
@@ -5220,7 +5261,7 @@
           </p:nvCxnSpPr>
           <p:spPr>
             <a:xfrm>
-              <a:off x="5484903" y="1894437"/>
+              <a:off x="5906008" y="2568205"/>
               <a:ext cx="115033" cy="302"/>
             </a:xfrm>
             <a:prstGeom prst="line">
@@ -5255,7 +5296,7 @@
           </p:nvGrpSpPr>
           <p:grpSpPr>
             <a:xfrm>
-              <a:off x="6011092" y="1444369"/>
+              <a:off x="6432197" y="2118137"/>
               <a:ext cx="537746" cy="623668"/>
               <a:chOff x="4622814" y="3336803"/>
               <a:chExt cx="651271" cy="755332"/>
@@ -5684,7 +5725,7 @@
           </p:nvCxnSpPr>
           <p:spPr>
             <a:xfrm flipV="1">
-              <a:off x="5926048" y="1894439"/>
+              <a:off x="6347153" y="2568207"/>
               <a:ext cx="123956" cy="301"/>
             </a:xfrm>
             <a:prstGeom prst="line">
@@ -5719,7 +5760,7 @@
           </p:nvGrpSpPr>
           <p:grpSpPr>
             <a:xfrm>
-              <a:off x="6692423" y="1452366"/>
+              <a:off x="7113528" y="2126134"/>
               <a:ext cx="505940" cy="615671"/>
               <a:chOff x="2182021" y="1270039"/>
               <a:chExt cx="612750" cy="745646"/>
@@ -5962,7 +6003,7 @@
           </p:nvCxnSpPr>
           <p:spPr>
             <a:xfrm>
-              <a:off x="6548839" y="1894439"/>
+              <a:off x="6969944" y="2568207"/>
               <a:ext cx="143585" cy="0"/>
             </a:xfrm>
             <a:prstGeom prst="line">
@@ -5997,7 +6038,7 @@
           </p:nvGrpSpPr>
           <p:grpSpPr>
             <a:xfrm>
-              <a:off x="7236964" y="1444369"/>
+              <a:off x="7658069" y="2118137"/>
               <a:ext cx="522900" cy="623668"/>
               <a:chOff x="2935534" y="1260353"/>
               <a:chExt cx="633290" cy="755331"/>
@@ -6091,7 +6132,7 @@
           </p:nvCxnSpPr>
           <p:spPr>
             <a:xfrm>
-              <a:off x="7191257" y="1894439"/>
+              <a:off x="7612362" y="2568207"/>
               <a:ext cx="130132" cy="1"/>
             </a:xfrm>
             <a:prstGeom prst="line">
@@ -6126,7 +6167,7 @@
           </p:nvGrpSpPr>
           <p:grpSpPr>
             <a:xfrm>
-              <a:off x="7780211" y="1444369"/>
+              <a:off x="8201316" y="2118137"/>
               <a:ext cx="498834" cy="623668"/>
               <a:chOff x="2182021" y="1260353"/>
               <a:chExt cx="604144" cy="755332"/>
@@ -6366,7 +6407,7 @@
           </p:nvGrpSpPr>
           <p:grpSpPr>
             <a:xfrm>
-              <a:off x="8324259" y="1434046"/>
+              <a:off x="8745364" y="2107814"/>
               <a:ext cx="516488" cy="647395"/>
               <a:chOff x="1445255" y="1260006"/>
               <a:chExt cx="625525" cy="784068"/>
@@ -6472,7 +6513,7 @@
           </p:nvCxnSpPr>
           <p:spPr>
             <a:xfrm flipV="1">
-              <a:off x="7647501" y="1894439"/>
+              <a:off x="8068606" y="2568207"/>
               <a:ext cx="132710" cy="1"/>
             </a:xfrm>
             <a:prstGeom prst="line">
@@ -6510,7 +6551,7 @@
           </p:nvCxnSpPr>
           <p:spPr>
             <a:xfrm flipV="1">
-              <a:off x="8279046" y="1894067"/>
+              <a:off x="8700151" y="2567835"/>
               <a:ext cx="116083" cy="372"/>
             </a:xfrm>
             <a:prstGeom prst="line">
@@ -6545,7 +6586,7 @@
           </p:nvGrpSpPr>
           <p:grpSpPr>
             <a:xfrm>
-              <a:off x="8754349" y="1428259"/>
+              <a:off x="9175454" y="2102027"/>
               <a:ext cx="776175" cy="639778"/>
               <a:chOff x="2869129" y="1240842"/>
               <a:chExt cx="940034" cy="774842"/>
@@ -6641,7 +6682,7 @@
           </p:nvCxnSpPr>
           <p:spPr>
             <a:xfrm>
-              <a:off x="8769878" y="1894067"/>
+              <a:off x="9190983" y="2567835"/>
               <a:ext cx="123725" cy="372"/>
             </a:xfrm>
             <a:prstGeom prst="line">
@@ -6676,7 +6717,7 @@
           </p:nvGrpSpPr>
           <p:grpSpPr>
             <a:xfrm>
-              <a:off x="9400669" y="1422310"/>
+              <a:off x="9821774" y="2096078"/>
               <a:ext cx="547650" cy="710557"/>
               <a:chOff x="6838093" y="3226443"/>
               <a:chExt cx="547650" cy="710557"/>
@@ -6805,7 +6846,7 @@
           </p:nvCxnSpPr>
           <p:spPr>
             <a:xfrm>
-              <a:off x="9219715" y="1894066"/>
+              <a:off x="9640820" y="2567834"/>
               <a:ext cx="295716" cy="0"/>
             </a:xfrm>
             <a:prstGeom prst="line">
@@ -6840,7 +6881,7 @@
           </p:nvGrpSpPr>
           <p:grpSpPr>
             <a:xfrm flipH="1">
-              <a:off x="10272772" y="1444748"/>
+              <a:off x="10693877" y="2118516"/>
               <a:ext cx="643733" cy="623668"/>
               <a:chOff x="527650" y="1260353"/>
               <a:chExt cx="780543" cy="755331"/>
@@ -6936,7 +6977,7 @@
           </p:nvCxnSpPr>
           <p:spPr>
             <a:xfrm>
-              <a:off x="9975056" y="1894437"/>
+              <a:off x="10396161" y="2568205"/>
               <a:ext cx="297716" cy="382"/>
             </a:xfrm>
             <a:prstGeom prst="line">
@@ -6973,7 +7014,7 @@
           </p:nvCxnSpPr>
           <p:spPr>
             <a:xfrm flipH="1" flipV="1">
-              <a:off x="9838216" y="1893706"/>
+              <a:off x="10259321" y="2567474"/>
               <a:ext cx="136840" cy="731"/>
             </a:xfrm>
             <a:prstGeom prst="line">
@@ -7008,7 +7049,7 @@
           </p:nvSpPr>
           <p:spPr>
             <a:xfrm>
-              <a:off x="4607003" y="326139"/>
+              <a:off x="5028108" y="999907"/>
               <a:ext cx="1995354" cy="400110"/>
             </a:xfrm>
             <a:prstGeom prst="rect">
@@ -7038,7 +7079,7 @@
           </p:nvSpPr>
           <p:spPr>
             <a:xfrm>
-              <a:off x="7259045" y="1121390"/>
+              <a:off x="7680150" y="1795158"/>
               <a:ext cx="1013419" cy="369332"/>
             </a:xfrm>
             <a:prstGeom prst="rect">
@@ -7072,7 +7113,7 @@
           </p:nvSpPr>
           <p:spPr>
             <a:xfrm>
-              <a:off x="350421" y="3562350"/>
+              <a:off x="771526" y="4236118"/>
               <a:ext cx="3836455" cy="863600"/>
             </a:xfrm>
             <a:prstGeom prst="rect">
@@ -7132,7 +7173,7 @@
           </p:nvCxnSpPr>
           <p:spPr>
             <a:xfrm flipV="1">
-              <a:off x="482600" y="2081441"/>
+              <a:off x="903705" y="2755209"/>
               <a:ext cx="0" cy="1480909"/>
             </a:xfrm>
             <a:prstGeom prst="straightConnector1">
@@ -7168,7 +7209,7 @@
           </p:nvSpPr>
           <p:spPr>
             <a:xfrm rot="16200000">
-              <a:off x="79385" y="2713096"/>
+              <a:off x="500490" y="3386864"/>
               <a:ext cx="542071" cy="307777"/>
             </a:xfrm>
             <a:prstGeom prst="rect">
@@ -7206,7 +7247,7 @@
           </p:nvSpPr>
           <p:spPr>
             <a:xfrm>
-              <a:off x="4358248" y="3557003"/>
+              <a:off x="4779353" y="4230771"/>
               <a:ext cx="1008738" cy="863600"/>
             </a:xfrm>
             <a:prstGeom prst="rect">
@@ -7277,7 +7318,7 @@
           </p:nvSpPr>
           <p:spPr>
             <a:xfrm>
-              <a:off x="5538358" y="3557003"/>
+              <a:off x="5959463" y="4230771"/>
               <a:ext cx="5378147" cy="863600"/>
             </a:xfrm>
             <a:prstGeom prst="rect">
@@ -7345,7 +7386,7 @@
           </p:nvCxnSpPr>
           <p:spPr>
             <a:xfrm>
-              <a:off x="10795000" y="2067304"/>
+              <a:off x="11216105" y="2741072"/>
               <a:ext cx="0" cy="1489699"/>
             </a:xfrm>
             <a:prstGeom prst="straightConnector1">
@@ -7381,7 +7422,7 @@
           </p:nvSpPr>
           <p:spPr>
             <a:xfrm rot="16200000">
-              <a:off x="10400650" y="2539513"/>
+              <a:off x="10828615" y="3209475"/>
               <a:ext cx="542071" cy="307777"/>
             </a:xfrm>
             <a:prstGeom prst="rect">
@@ -7413,47 +7454,6 @@
         </p:sp>
         <p:cxnSp>
           <p:nvCxnSpPr>
-            <p:cNvPr id="250" name="Elbow Connector 249"/>
-            <p:cNvCxnSpPr>
-              <a:stCxn id="252" idx="0"/>
-              <a:endCxn id="263" idx="2"/>
-            </p:cNvCxnSpPr>
-            <p:nvPr/>
-          </p:nvCxnSpPr>
-          <p:spPr>
-            <a:xfrm rot="5400000" flipH="1" flipV="1">
-              <a:off x="7139375" y="160505"/>
-              <a:ext cx="1497841" cy="5295155"/>
-            </a:xfrm>
-            <a:prstGeom prst="bentConnector3">
-              <a:avLst>
-                <a:gd name="adj1" fmla="val 20430"/>
-              </a:avLst>
-            </a:prstGeom>
-            <a:ln w="12700">
-              <a:solidFill>
-                <a:schemeClr val="accent6"/>
-              </a:solidFill>
-              <a:tailEnd type="triangle"/>
-            </a:ln>
-          </p:spPr>
-          <p:style>
-            <a:lnRef idx="1">
-              <a:schemeClr val="accent1"/>
-            </a:lnRef>
-            <a:fillRef idx="0">
-              <a:schemeClr val="accent1"/>
-            </a:fillRef>
-            <a:effectRef idx="0">
-              <a:schemeClr val="accent1"/>
-            </a:effectRef>
-            <a:fontRef idx="minor">
-              <a:schemeClr val="tx1"/>
-            </a:fontRef>
-          </p:style>
-        </p:cxnSp>
-        <p:cxnSp>
-          <p:nvCxnSpPr>
             <p:cNvPr id="256" name="Elbow Connector 255"/>
             <p:cNvCxnSpPr>
               <a:stCxn id="254" idx="0"/>
@@ -7463,7 +7463,7 @@
           </p:nvCxnSpPr>
           <p:spPr>
             <a:xfrm rot="16200000" flipV="1">
-              <a:off x="1841747" y="928391"/>
+              <a:off x="2262852" y="1602159"/>
               <a:ext cx="1496488" cy="3765907"/>
             </a:xfrm>
             <a:prstGeom prst="bentConnector3">
@@ -7501,7 +7501,7 @@
           </p:nvSpPr>
           <p:spPr>
             <a:xfrm rot="16200000">
-              <a:off x="418454" y="2701602"/>
+              <a:off x="839559" y="3375370"/>
               <a:ext cx="404278" cy="307777"/>
             </a:xfrm>
             <a:prstGeom prst="rect">
@@ -7539,7 +7539,7 @@
           </p:nvSpPr>
           <p:spPr>
             <a:xfrm rot="16200000">
-              <a:off x="10224716" y="2539514"/>
+              <a:off x="10645821" y="3213282"/>
               <a:ext cx="404278" cy="307777"/>
             </a:xfrm>
             <a:prstGeom prst="rect">
@@ -7556,14 +7556,14 @@
               <a:r>
                 <a:rPr lang="en-US" sz="1400" dirty="0" smtClean="0">
                   <a:solidFill>
-                    <a:schemeClr val="accent6"/>
+                    <a:srgbClr val="7030A0"/>
                   </a:solidFill>
                 </a:rPr>
                 <a:t>SPI</a:t>
               </a:r>
               <a:endParaRPr lang="en-US" sz="1400" dirty="0">
                 <a:solidFill>
-                  <a:schemeClr val="accent6"/>
+                  <a:srgbClr val="7030A0"/>
                 </a:solidFill>
               </a:endParaRPr>
             </a:p>
@@ -7580,7 +7580,7 @@
           </p:nvCxnSpPr>
           <p:spPr>
             <a:xfrm flipH="1" flipV="1">
-              <a:off x="6299421" y="2068037"/>
+              <a:off x="6720526" y="2741805"/>
               <a:ext cx="2653" cy="1497841"/>
             </a:xfrm>
             <a:prstGeom prst="straightConnector1">
@@ -7619,7 +7619,7 @@
           </p:nvCxnSpPr>
           <p:spPr>
             <a:xfrm flipV="1">
-              <a:off x="9674494" y="2037863"/>
+              <a:off x="10095599" y="2711631"/>
               <a:ext cx="0" cy="1524487"/>
             </a:xfrm>
             <a:prstGeom prst="straightConnector1">
@@ -7655,7 +7655,7 @@
           </p:nvSpPr>
           <p:spPr>
             <a:xfrm rot="16200000">
-              <a:off x="9379163" y="2747275"/>
+              <a:off x="9800268" y="3421043"/>
               <a:ext cx="404278" cy="307777"/>
             </a:xfrm>
             <a:prstGeom prst="rect">
@@ -7693,7 +7693,7 @@
           </p:nvSpPr>
           <p:spPr>
             <a:xfrm rot="16200000">
-              <a:off x="5826912" y="2799108"/>
+              <a:off x="6248017" y="3472876"/>
               <a:ext cx="744114" cy="261610"/>
             </a:xfrm>
             <a:prstGeom prst="rect">
@@ -7734,7 +7734,7 @@
           </p:nvCxnSpPr>
           <p:spPr>
             <a:xfrm rot="5400000" flipH="1" flipV="1">
-              <a:off x="3738863" y="2442126"/>
+              <a:off x="4159968" y="3115894"/>
               <a:ext cx="1352789" cy="894717"/>
             </a:xfrm>
             <a:prstGeom prst="bentConnector3">
@@ -7770,8 +7770,8 @@
           </p:nvSpPr>
           <p:spPr>
             <a:xfrm>
-              <a:off x="4009644" y="2637419"/>
-              <a:ext cx="823815" cy="307777"/>
+              <a:off x="4430749" y="3311187"/>
+              <a:ext cx="554960" cy="307777"/>
             </a:xfrm>
             <a:prstGeom prst="rect">
               <a:avLst/>
@@ -7790,7 +7790,7 @@
                     <a:schemeClr val="accent2"/>
                   </a:solidFill>
                 </a:rPr>
-                <a:t>SW CTRL</a:t>
+                <a:t>GPIO</a:t>
               </a:r>
               <a:endParaRPr lang="en-US" sz="1400" dirty="0">
                 <a:solidFill>
@@ -7810,7 +7810,7 @@
           </p:nvCxnSpPr>
           <p:spPr>
             <a:xfrm flipV="1">
-              <a:off x="7326339" y="2081441"/>
+              <a:off x="7747444" y="2755209"/>
               <a:ext cx="1256165" cy="794115"/>
             </a:xfrm>
             <a:prstGeom prst="bentConnector2">
@@ -7848,7 +7848,7 @@
           </p:nvCxnSpPr>
           <p:spPr>
             <a:xfrm rot="10800000">
-              <a:off x="1509963" y="2081815"/>
+              <a:off x="1931068" y="2755583"/>
               <a:ext cx="1307656" cy="818885"/>
             </a:xfrm>
             <a:prstGeom prst="bentConnector2">
@@ -7884,7 +7884,7 @@
           </p:nvSpPr>
           <p:spPr>
             <a:xfrm>
-              <a:off x="1517634" y="2638853"/>
+              <a:off x="1938739" y="3312621"/>
               <a:ext cx="1588448" cy="523220"/>
             </a:xfrm>
             <a:prstGeom prst="rect">
@@ -7932,7 +7932,7 @@
           </p:nvSpPr>
           <p:spPr>
             <a:xfrm>
-              <a:off x="7198363" y="2605374"/>
+              <a:off x="7619468" y="3279142"/>
               <a:ext cx="1588448" cy="523220"/>
             </a:xfrm>
             <a:prstGeom prst="rect">
@@ -7972,11 +7972,3870 @@
             </a:p>
           </p:txBody>
         </p:sp>
+        <p:cxnSp>
+          <p:nvCxnSpPr>
+            <p:cNvPr id="300" name="Straight Arrow Connector 299"/>
+            <p:cNvCxnSpPr/>
+            <p:nvPr/>
+          </p:nvCxnSpPr>
+          <p:spPr>
+            <a:xfrm flipV="1">
+              <a:off x="10956978" y="2741072"/>
+              <a:ext cx="0" cy="1480444"/>
+            </a:xfrm>
+            <a:prstGeom prst="straightConnector1">
+              <a:avLst/>
+            </a:prstGeom>
+            <a:ln w="12700">
+              <a:solidFill>
+                <a:srgbClr val="7030A0"/>
+              </a:solidFill>
+              <a:tailEnd type="triangle"/>
+            </a:ln>
+          </p:spPr>
+          <p:style>
+            <a:lnRef idx="1">
+              <a:schemeClr val="accent1"/>
+            </a:lnRef>
+            <a:fillRef idx="0">
+              <a:schemeClr val="accent1"/>
+            </a:fillRef>
+            <a:effectRef idx="0">
+              <a:schemeClr val="accent1"/>
+            </a:effectRef>
+            <a:fontRef idx="minor">
+              <a:schemeClr val="tx1"/>
+            </a:fontRef>
+          </p:style>
+        </p:cxnSp>
       </p:grpSp>
     </p:spTree>
     <p:extLst>
       <p:ext uri="{BB962C8B-B14F-4D97-AF65-F5344CB8AC3E}">
         <p14:creationId xmlns:p14="http://schemas.microsoft.com/office/powerpoint/2010/main" val="1952448654"/>
+      </p:ext>
+    </p:extLst>
+  </p:cSld>
+  <p:clrMapOvr>
+    <a:masterClrMapping/>
+  </p:clrMapOvr>
+</p:sld>
+</file>
+
+<file path=ppt/slides/slide2.xml><?xml version="1.0" encoding="utf-8"?>
+<p:sld xmlns:a="http://schemas.openxmlformats.org/drawingml/2006/main" xmlns:r="http://schemas.openxmlformats.org/officeDocument/2006/relationships" xmlns:p="http://schemas.openxmlformats.org/presentationml/2006/main">
+  <p:cSld>
+    <p:spTree>
+      <p:nvGrpSpPr>
+        <p:cNvPr id="1" name=""/>
+        <p:cNvGrpSpPr/>
+        <p:nvPr/>
+      </p:nvGrpSpPr>
+      <p:grpSpPr>
+        <a:xfrm>
+          <a:off x="0" y="0"/>
+          <a:ext cx="0" cy="0"/>
+          <a:chOff x="0" y="0"/>
+          <a:chExt cx="0" cy="0"/>
+        </a:xfrm>
+      </p:grpSpPr>
+      <p:grpSp>
+        <p:nvGrpSpPr>
+          <p:cNvPr id="201" name="Group 200"/>
+          <p:cNvGrpSpPr/>
+          <p:nvPr/>
+        </p:nvGrpSpPr>
+        <p:grpSpPr>
+          <a:xfrm>
+            <a:off x="404404" y="400050"/>
+            <a:ext cx="11480497" cy="4692650"/>
+            <a:chOff x="339713" y="133350"/>
+            <a:chExt cx="11480497" cy="4692650"/>
+          </a:xfrm>
+        </p:grpSpPr>
+        <p:sp>
+          <p:nvSpPr>
+            <p:cNvPr id="30" name="Rectangle 29"/>
+            <p:cNvSpPr/>
+            <p:nvPr/>
+          </p:nvSpPr>
+          <p:spPr>
+            <a:xfrm>
+              <a:off x="11635104" y="4383169"/>
+              <a:ext cx="82550" cy="93579"/>
+            </a:xfrm>
+            <a:prstGeom prst="rect">
+              <a:avLst/>
+            </a:prstGeom>
+          </p:spPr>
+          <p:style>
+            <a:lnRef idx="2">
+              <a:schemeClr val="accent1">
+                <a:shade val="50000"/>
+              </a:schemeClr>
+            </a:lnRef>
+            <a:fillRef idx="1">
+              <a:schemeClr val="accent1"/>
+            </a:fillRef>
+            <a:effectRef idx="0">
+              <a:schemeClr val="accent1"/>
+            </a:effectRef>
+            <a:fontRef idx="minor">
+              <a:schemeClr val="lt1"/>
+            </a:fontRef>
+          </p:style>
+          <p:txBody>
+            <a:bodyPr rtlCol="0" anchor="ctr"/>
+            <a:lstStyle/>
+            <a:p>
+              <a:pPr algn="ctr"/>
+              <a:endParaRPr lang="en-US"/>
+            </a:p>
+          </p:txBody>
+        </p:sp>
+        <p:sp>
+          <p:nvSpPr>
+            <p:cNvPr id="126" name="Rectangle 125"/>
+            <p:cNvSpPr/>
+            <p:nvPr/>
+          </p:nvSpPr>
+          <p:spPr>
+            <a:xfrm>
+              <a:off x="11370551" y="4383169"/>
+              <a:ext cx="82550" cy="93579"/>
+            </a:xfrm>
+            <a:prstGeom prst="rect">
+              <a:avLst/>
+            </a:prstGeom>
+          </p:spPr>
+          <p:style>
+            <a:lnRef idx="2">
+              <a:schemeClr val="accent1">
+                <a:shade val="50000"/>
+              </a:schemeClr>
+            </a:lnRef>
+            <a:fillRef idx="1">
+              <a:schemeClr val="accent1"/>
+            </a:fillRef>
+            <a:effectRef idx="0">
+              <a:schemeClr val="accent1"/>
+            </a:effectRef>
+            <a:fontRef idx="minor">
+              <a:schemeClr val="lt1"/>
+            </a:fontRef>
+          </p:style>
+          <p:txBody>
+            <a:bodyPr rtlCol="0" anchor="ctr"/>
+            <a:lstStyle/>
+            <a:p>
+              <a:pPr algn="ctr"/>
+              <a:endParaRPr lang="en-US"/>
+            </a:p>
+          </p:txBody>
+        </p:sp>
+        <p:sp>
+          <p:nvSpPr>
+            <p:cNvPr id="34" name="Rectangle 33"/>
+            <p:cNvSpPr/>
+            <p:nvPr/>
+          </p:nvSpPr>
+          <p:spPr>
+            <a:xfrm>
+              <a:off x="1020745" y="2325868"/>
+              <a:ext cx="82550" cy="93579"/>
+            </a:xfrm>
+            <a:prstGeom prst="rect">
+              <a:avLst/>
+            </a:prstGeom>
+          </p:spPr>
+          <p:style>
+            <a:lnRef idx="2">
+              <a:schemeClr val="accent1">
+                <a:shade val="50000"/>
+              </a:schemeClr>
+            </a:lnRef>
+            <a:fillRef idx="1">
+              <a:schemeClr val="accent1"/>
+            </a:fillRef>
+            <a:effectRef idx="0">
+              <a:schemeClr val="accent1"/>
+            </a:effectRef>
+            <a:fontRef idx="minor">
+              <a:schemeClr val="lt1"/>
+            </a:fontRef>
+          </p:style>
+          <p:txBody>
+            <a:bodyPr rtlCol="0" anchor="ctr"/>
+            <a:lstStyle/>
+            <a:p>
+              <a:pPr algn="ctr"/>
+              <a:endParaRPr lang="en-US"/>
+            </a:p>
+          </p:txBody>
+        </p:sp>
+        <p:sp>
+          <p:nvSpPr>
+            <p:cNvPr id="42" name="Rectangle 41"/>
+            <p:cNvSpPr/>
+            <p:nvPr/>
+          </p:nvSpPr>
+          <p:spPr>
+            <a:xfrm>
+              <a:off x="768326" y="574173"/>
+              <a:ext cx="82550" cy="93579"/>
+            </a:xfrm>
+            <a:prstGeom prst="rect">
+              <a:avLst/>
+            </a:prstGeom>
+          </p:spPr>
+          <p:style>
+            <a:lnRef idx="2">
+              <a:schemeClr val="accent1">
+                <a:shade val="50000"/>
+              </a:schemeClr>
+            </a:lnRef>
+            <a:fillRef idx="1">
+              <a:schemeClr val="accent1"/>
+            </a:fillRef>
+            <a:effectRef idx="0">
+              <a:schemeClr val="accent1"/>
+            </a:effectRef>
+            <a:fontRef idx="minor">
+              <a:schemeClr val="lt1"/>
+            </a:fontRef>
+          </p:style>
+          <p:txBody>
+            <a:bodyPr rtlCol="0" anchor="ctr"/>
+            <a:lstStyle/>
+            <a:p>
+              <a:pPr algn="ctr"/>
+              <a:endParaRPr lang="en-US"/>
+            </a:p>
+          </p:txBody>
+        </p:sp>
+        <p:sp>
+          <p:nvSpPr>
+            <p:cNvPr id="81" name="Rectangle 80"/>
+            <p:cNvSpPr/>
+            <p:nvPr/>
+          </p:nvSpPr>
+          <p:spPr>
+            <a:xfrm>
+              <a:off x="1517472" y="1279357"/>
+              <a:ext cx="82550" cy="93579"/>
+            </a:xfrm>
+            <a:prstGeom prst="rect">
+              <a:avLst/>
+            </a:prstGeom>
+          </p:spPr>
+          <p:style>
+            <a:lnRef idx="2">
+              <a:schemeClr val="accent1">
+                <a:shade val="50000"/>
+              </a:schemeClr>
+            </a:lnRef>
+            <a:fillRef idx="1">
+              <a:schemeClr val="accent1"/>
+            </a:fillRef>
+            <a:effectRef idx="0">
+              <a:schemeClr val="accent1"/>
+            </a:effectRef>
+            <a:fontRef idx="minor">
+              <a:schemeClr val="lt1"/>
+            </a:fontRef>
+          </p:style>
+          <p:txBody>
+            <a:bodyPr rtlCol="0" anchor="ctr"/>
+            <a:lstStyle/>
+            <a:p>
+              <a:pPr algn="ctr"/>
+              <a:endParaRPr lang="en-US"/>
+            </a:p>
+          </p:txBody>
+        </p:sp>
+        <p:sp>
+          <p:nvSpPr>
+            <p:cNvPr id="82" name="Rectangle 81"/>
+            <p:cNvSpPr/>
+            <p:nvPr/>
+          </p:nvSpPr>
+          <p:spPr>
+            <a:xfrm>
+              <a:off x="1517472" y="1024522"/>
+              <a:ext cx="82550" cy="93579"/>
+            </a:xfrm>
+            <a:prstGeom prst="rect">
+              <a:avLst/>
+            </a:prstGeom>
+          </p:spPr>
+          <p:style>
+            <a:lnRef idx="2">
+              <a:schemeClr val="accent1">
+                <a:shade val="50000"/>
+              </a:schemeClr>
+            </a:lnRef>
+            <a:fillRef idx="1">
+              <a:schemeClr val="accent1"/>
+            </a:fillRef>
+            <a:effectRef idx="0">
+              <a:schemeClr val="accent1"/>
+            </a:effectRef>
+            <a:fontRef idx="minor">
+              <a:schemeClr val="lt1"/>
+            </a:fontRef>
+          </p:style>
+          <p:txBody>
+            <a:bodyPr rtlCol="0" anchor="ctr"/>
+            <a:lstStyle/>
+            <a:p>
+              <a:pPr algn="ctr"/>
+              <a:endParaRPr lang="en-US"/>
+            </a:p>
+          </p:txBody>
+        </p:sp>
+        <p:sp>
+          <p:nvSpPr>
+            <p:cNvPr id="84" name="Rectangle 83"/>
+            <p:cNvSpPr/>
+            <p:nvPr/>
+          </p:nvSpPr>
+          <p:spPr>
+            <a:xfrm>
+              <a:off x="1513053" y="694488"/>
+              <a:ext cx="82550" cy="93579"/>
+            </a:xfrm>
+            <a:prstGeom prst="rect">
+              <a:avLst/>
+            </a:prstGeom>
+          </p:spPr>
+          <p:style>
+            <a:lnRef idx="2">
+              <a:schemeClr val="accent1">
+                <a:shade val="50000"/>
+              </a:schemeClr>
+            </a:lnRef>
+            <a:fillRef idx="1">
+              <a:schemeClr val="accent1"/>
+            </a:fillRef>
+            <a:effectRef idx="0">
+              <a:schemeClr val="accent1"/>
+            </a:effectRef>
+            <a:fontRef idx="minor">
+              <a:schemeClr val="lt1"/>
+            </a:fontRef>
+          </p:style>
+          <p:txBody>
+            <a:bodyPr rtlCol="0" anchor="ctr"/>
+            <a:lstStyle/>
+            <a:p>
+              <a:pPr algn="ctr"/>
+              <a:endParaRPr lang="en-US"/>
+            </a:p>
+          </p:txBody>
+        </p:sp>
+        <p:sp>
+          <p:nvSpPr>
+            <p:cNvPr id="86" name="Rectangle 85"/>
+            <p:cNvSpPr/>
+            <p:nvPr/>
+          </p:nvSpPr>
+          <p:spPr>
+            <a:xfrm>
+              <a:off x="4877001" y="2232289"/>
+              <a:ext cx="82550" cy="93579"/>
+            </a:xfrm>
+            <a:prstGeom prst="rect">
+              <a:avLst/>
+            </a:prstGeom>
+          </p:spPr>
+          <p:style>
+            <a:lnRef idx="2">
+              <a:schemeClr val="accent1">
+                <a:shade val="50000"/>
+              </a:schemeClr>
+            </a:lnRef>
+            <a:fillRef idx="1">
+              <a:schemeClr val="accent1"/>
+            </a:fillRef>
+            <a:effectRef idx="0">
+              <a:schemeClr val="accent1"/>
+            </a:effectRef>
+            <a:fontRef idx="minor">
+              <a:schemeClr val="lt1"/>
+            </a:fontRef>
+          </p:style>
+          <p:txBody>
+            <a:bodyPr rtlCol="0" anchor="ctr"/>
+            <a:lstStyle/>
+            <a:p>
+              <a:pPr algn="ctr"/>
+              <a:endParaRPr lang="en-US"/>
+            </a:p>
+          </p:txBody>
+        </p:sp>
+        <p:sp>
+          <p:nvSpPr>
+            <p:cNvPr id="87" name="Rectangle 86"/>
+            <p:cNvSpPr/>
+            <p:nvPr/>
+          </p:nvSpPr>
+          <p:spPr>
+            <a:xfrm>
+              <a:off x="8490500" y="2218467"/>
+              <a:ext cx="82550" cy="93579"/>
+            </a:xfrm>
+            <a:prstGeom prst="rect">
+              <a:avLst/>
+            </a:prstGeom>
+          </p:spPr>
+          <p:style>
+            <a:lnRef idx="2">
+              <a:schemeClr val="accent1">
+                <a:shade val="50000"/>
+              </a:schemeClr>
+            </a:lnRef>
+            <a:fillRef idx="1">
+              <a:schemeClr val="accent1"/>
+            </a:fillRef>
+            <a:effectRef idx="0">
+              <a:schemeClr val="accent1"/>
+            </a:effectRef>
+            <a:fontRef idx="minor">
+              <a:schemeClr val="lt1"/>
+            </a:fontRef>
+          </p:style>
+          <p:txBody>
+            <a:bodyPr rtlCol="0" anchor="ctr"/>
+            <a:lstStyle/>
+            <a:p>
+              <a:pPr algn="ctr"/>
+              <a:endParaRPr lang="en-US"/>
+            </a:p>
+          </p:txBody>
+        </p:sp>
+        <p:sp>
+          <p:nvSpPr>
+            <p:cNvPr id="102" name="Rectangle 101"/>
+            <p:cNvSpPr/>
+            <p:nvPr/>
+          </p:nvSpPr>
+          <p:spPr>
+            <a:xfrm>
+              <a:off x="3144640" y="2219973"/>
+              <a:ext cx="82550" cy="93579"/>
+            </a:xfrm>
+            <a:prstGeom prst="rect">
+              <a:avLst/>
+            </a:prstGeom>
+          </p:spPr>
+          <p:style>
+            <a:lnRef idx="2">
+              <a:schemeClr val="accent1">
+                <a:shade val="50000"/>
+              </a:schemeClr>
+            </a:lnRef>
+            <a:fillRef idx="1">
+              <a:schemeClr val="accent1"/>
+            </a:fillRef>
+            <a:effectRef idx="0">
+              <a:schemeClr val="accent1"/>
+            </a:effectRef>
+            <a:fontRef idx="minor">
+              <a:schemeClr val="lt1"/>
+            </a:fontRef>
+          </p:style>
+          <p:txBody>
+            <a:bodyPr rtlCol="0" anchor="ctr"/>
+            <a:lstStyle/>
+            <a:p>
+              <a:pPr algn="ctr"/>
+              <a:endParaRPr lang="en-US"/>
+            </a:p>
+          </p:txBody>
+        </p:sp>
+        <p:sp>
+          <p:nvSpPr>
+            <p:cNvPr id="103" name="Rectangle 102"/>
+            <p:cNvSpPr/>
+            <p:nvPr/>
+          </p:nvSpPr>
+          <p:spPr>
+            <a:xfrm>
+              <a:off x="6741815" y="2219972"/>
+              <a:ext cx="82550" cy="93579"/>
+            </a:xfrm>
+            <a:prstGeom prst="rect">
+              <a:avLst/>
+            </a:prstGeom>
+          </p:spPr>
+          <p:style>
+            <a:lnRef idx="2">
+              <a:schemeClr val="accent1">
+                <a:shade val="50000"/>
+              </a:schemeClr>
+            </a:lnRef>
+            <a:fillRef idx="1">
+              <a:schemeClr val="accent1"/>
+            </a:fillRef>
+            <a:effectRef idx="0">
+              <a:schemeClr val="accent1"/>
+            </a:effectRef>
+            <a:fontRef idx="minor">
+              <a:schemeClr val="lt1"/>
+            </a:fontRef>
+          </p:style>
+          <p:txBody>
+            <a:bodyPr rtlCol="0" anchor="ctr"/>
+            <a:lstStyle/>
+            <a:p>
+              <a:pPr algn="ctr"/>
+              <a:endParaRPr lang="en-US"/>
+            </a:p>
+          </p:txBody>
+        </p:sp>
+        <p:sp>
+          <p:nvSpPr>
+            <p:cNvPr id="105" name="Rectangle 104"/>
+            <p:cNvSpPr/>
+            <p:nvPr/>
+          </p:nvSpPr>
+          <p:spPr>
+            <a:xfrm>
+              <a:off x="10355314" y="2225938"/>
+              <a:ext cx="82550" cy="93579"/>
+            </a:xfrm>
+            <a:prstGeom prst="rect">
+              <a:avLst/>
+            </a:prstGeom>
+          </p:spPr>
+          <p:style>
+            <a:lnRef idx="2">
+              <a:schemeClr val="accent1">
+                <a:shade val="50000"/>
+              </a:schemeClr>
+            </a:lnRef>
+            <a:fillRef idx="1">
+              <a:schemeClr val="accent1"/>
+            </a:fillRef>
+            <a:effectRef idx="0">
+              <a:schemeClr val="accent1"/>
+            </a:effectRef>
+            <a:fontRef idx="minor">
+              <a:schemeClr val="lt1"/>
+            </a:fontRef>
+          </p:style>
+          <p:txBody>
+            <a:bodyPr rtlCol="0" anchor="ctr"/>
+            <a:lstStyle/>
+            <a:p>
+              <a:pPr algn="ctr"/>
+              <a:endParaRPr lang="en-US"/>
+            </a:p>
+          </p:txBody>
+        </p:sp>
+        <p:sp>
+          <p:nvSpPr>
+            <p:cNvPr id="111" name="Rectangle 110"/>
+            <p:cNvSpPr/>
+            <p:nvPr/>
+          </p:nvSpPr>
+          <p:spPr>
+            <a:xfrm>
+              <a:off x="1340981" y="1326146"/>
+              <a:ext cx="82550" cy="93579"/>
+            </a:xfrm>
+            <a:prstGeom prst="rect">
+              <a:avLst/>
+            </a:prstGeom>
+          </p:spPr>
+          <p:style>
+            <a:lnRef idx="2">
+              <a:schemeClr val="accent1">
+                <a:shade val="50000"/>
+              </a:schemeClr>
+            </a:lnRef>
+            <a:fillRef idx="1">
+              <a:schemeClr val="accent1"/>
+            </a:fillRef>
+            <a:effectRef idx="0">
+              <a:schemeClr val="accent1"/>
+            </a:effectRef>
+            <a:fontRef idx="minor">
+              <a:schemeClr val="lt1"/>
+            </a:fontRef>
+          </p:style>
+          <p:txBody>
+            <a:bodyPr rtlCol="0" anchor="ctr"/>
+            <a:lstStyle/>
+            <a:p>
+              <a:pPr algn="ctr"/>
+              <a:endParaRPr lang="en-US"/>
+            </a:p>
+          </p:txBody>
+        </p:sp>
+        <p:sp>
+          <p:nvSpPr>
+            <p:cNvPr id="163" name="Rectangle 162"/>
+            <p:cNvSpPr/>
+            <p:nvPr/>
+          </p:nvSpPr>
+          <p:spPr>
+            <a:xfrm>
+              <a:off x="8995509" y="2225937"/>
+              <a:ext cx="82550" cy="93579"/>
+            </a:xfrm>
+            <a:prstGeom prst="rect">
+              <a:avLst/>
+            </a:prstGeom>
+          </p:spPr>
+          <p:style>
+            <a:lnRef idx="2">
+              <a:schemeClr val="accent1">
+                <a:shade val="50000"/>
+              </a:schemeClr>
+            </a:lnRef>
+            <a:fillRef idx="1">
+              <a:schemeClr val="accent1"/>
+            </a:fillRef>
+            <a:effectRef idx="0">
+              <a:schemeClr val="accent1"/>
+            </a:effectRef>
+            <a:fontRef idx="minor">
+              <a:schemeClr val="lt1"/>
+            </a:fontRef>
+          </p:style>
+          <p:txBody>
+            <a:bodyPr rtlCol="0" anchor="ctr"/>
+            <a:lstStyle/>
+            <a:p>
+              <a:pPr algn="ctr"/>
+              <a:endParaRPr lang="en-US"/>
+            </a:p>
+          </p:txBody>
+        </p:sp>
+        <p:sp>
+          <p:nvSpPr>
+            <p:cNvPr id="164" name="Rectangle 163"/>
+            <p:cNvSpPr/>
+            <p:nvPr/>
+          </p:nvSpPr>
+          <p:spPr>
+            <a:xfrm>
+              <a:off x="9648301" y="2228540"/>
+              <a:ext cx="82550" cy="93579"/>
+            </a:xfrm>
+            <a:prstGeom prst="rect">
+              <a:avLst/>
+            </a:prstGeom>
+          </p:spPr>
+          <p:style>
+            <a:lnRef idx="2">
+              <a:schemeClr val="accent1">
+                <a:shade val="50000"/>
+              </a:schemeClr>
+            </a:lnRef>
+            <a:fillRef idx="1">
+              <a:schemeClr val="accent1"/>
+            </a:fillRef>
+            <a:effectRef idx="0">
+              <a:schemeClr val="accent1"/>
+            </a:effectRef>
+            <a:fontRef idx="minor">
+              <a:schemeClr val="lt1"/>
+            </a:fontRef>
+          </p:style>
+          <p:txBody>
+            <a:bodyPr rtlCol="0" anchor="ctr"/>
+            <a:lstStyle/>
+            <a:p>
+              <a:pPr algn="ctr"/>
+              <a:endParaRPr lang="en-US"/>
+            </a:p>
+          </p:txBody>
+        </p:sp>
+        <p:sp>
+          <p:nvSpPr>
+            <p:cNvPr id="165" name="Rectangle 164"/>
+            <p:cNvSpPr/>
+            <p:nvPr/>
+          </p:nvSpPr>
+          <p:spPr>
+            <a:xfrm>
+              <a:off x="9967455" y="2232288"/>
+              <a:ext cx="82550" cy="93579"/>
+            </a:xfrm>
+            <a:prstGeom prst="rect">
+              <a:avLst/>
+            </a:prstGeom>
+          </p:spPr>
+          <p:style>
+            <a:lnRef idx="2">
+              <a:schemeClr val="accent1">
+                <a:shade val="50000"/>
+              </a:schemeClr>
+            </a:lnRef>
+            <a:fillRef idx="1">
+              <a:schemeClr val="accent1"/>
+            </a:fillRef>
+            <a:effectRef idx="0">
+              <a:schemeClr val="accent1"/>
+            </a:effectRef>
+            <a:fontRef idx="minor">
+              <a:schemeClr val="lt1"/>
+            </a:fontRef>
+          </p:style>
+          <p:txBody>
+            <a:bodyPr rtlCol="0" anchor="ctr"/>
+            <a:lstStyle/>
+            <a:p>
+              <a:pPr algn="ctr"/>
+              <a:endParaRPr lang="en-US"/>
+            </a:p>
+          </p:txBody>
+        </p:sp>
+        <p:sp>
+          <p:nvSpPr>
+            <p:cNvPr id="188" name="Rectangle 187"/>
+            <p:cNvSpPr/>
+            <p:nvPr/>
+          </p:nvSpPr>
+          <p:spPr>
+            <a:xfrm>
+              <a:off x="9648921" y="1204664"/>
+              <a:ext cx="82550" cy="93579"/>
+            </a:xfrm>
+            <a:prstGeom prst="rect">
+              <a:avLst/>
+            </a:prstGeom>
+          </p:spPr>
+          <p:style>
+            <a:lnRef idx="2">
+              <a:schemeClr val="accent1">
+                <a:shade val="50000"/>
+              </a:schemeClr>
+            </a:lnRef>
+            <a:fillRef idx="1">
+              <a:schemeClr val="accent1"/>
+            </a:fillRef>
+            <a:effectRef idx="0">
+              <a:schemeClr val="accent1"/>
+            </a:effectRef>
+            <a:fontRef idx="minor">
+              <a:schemeClr val="lt1"/>
+            </a:fontRef>
+          </p:style>
+          <p:txBody>
+            <a:bodyPr rtlCol="0" anchor="ctr"/>
+            <a:lstStyle/>
+            <a:p>
+              <a:pPr algn="ctr"/>
+              <a:endParaRPr lang="en-US"/>
+            </a:p>
+          </p:txBody>
+        </p:sp>
+        <p:sp>
+          <p:nvSpPr>
+            <p:cNvPr id="189" name="Rectangle 188"/>
+            <p:cNvSpPr/>
+            <p:nvPr/>
+          </p:nvSpPr>
+          <p:spPr>
+            <a:xfrm>
+              <a:off x="9967455" y="1206432"/>
+              <a:ext cx="82550" cy="93579"/>
+            </a:xfrm>
+            <a:prstGeom prst="rect">
+              <a:avLst/>
+            </a:prstGeom>
+          </p:spPr>
+          <p:style>
+            <a:lnRef idx="2">
+              <a:schemeClr val="accent1">
+                <a:shade val="50000"/>
+              </a:schemeClr>
+            </a:lnRef>
+            <a:fillRef idx="1">
+              <a:schemeClr val="accent1"/>
+            </a:fillRef>
+            <a:effectRef idx="0">
+              <a:schemeClr val="accent1"/>
+            </a:effectRef>
+            <a:fontRef idx="minor">
+              <a:schemeClr val="lt1"/>
+            </a:fontRef>
+          </p:style>
+          <p:txBody>
+            <a:bodyPr rtlCol="0" anchor="ctr"/>
+            <a:lstStyle/>
+            <a:p>
+              <a:pPr algn="ctr"/>
+              <a:endParaRPr lang="en-US"/>
+            </a:p>
+          </p:txBody>
+        </p:sp>
+        <p:sp>
+          <p:nvSpPr>
+            <p:cNvPr id="5" name="Rectangle 4"/>
+            <p:cNvSpPr/>
+            <p:nvPr/>
+          </p:nvSpPr>
+          <p:spPr>
+            <a:xfrm>
+              <a:off x="1023581" y="2224269"/>
+              <a:ext cx="2406977" cy="639679"/>
+            </a:xfrm>
+            <a:prstGeom prst="rect">
+              <a:avLst/>
+            </a:prstGeom>
+            <a:solidFill>
+              <a:schemeClr val="bg1"/>
+            </a:solidFill>
+            <a:ln w="28575">
+              <a:solidFill>
+                <a:schemeClr val="accent2"/>
+              </a:solidFill>
+            </a:ln>
+          </p:spPr>
+          <p:style>
+            <a:lnRef idx="2">
+              <a:schemeClr val="accent1">
+                <a:shade val="50000"/>
+              </a:schemeClr>
+            </a:lnRef>
+            <a:fillRef idx="1">
+              <a:schemeClr val="accent1"/>
+            </a:fillRef>
+            <a:effectRef idx="0">
+              <a:schemeClr val="accent1"/>
+            </a:effectRef>
+            <a:fontRef idx="minor">
+              <a:schemeClr val="lt1"/>
+            </a:fontRef>
+          </p:style>
+          <p:txBody>
+            <a:bodyPr rtlCol="0" anchor="ctr"/>
+            <a:lstStyle/>
+            <a:p>
+              <a:pPr algn="ctr"/>
+              <a:r>
+                <a:rPr lang="en-US" dirty="0">
+                  <a:solidFill>
+                    <a:schemeClr val="accent2"/>
+                  </a:solidFill>
+                </a:rPr>
+                <a:t>R</a:t>
+              </a:r>
+              <a:r>
+                <a:rPr lang="en-US" dirty="0" smtClean="0">
+                  <a:solidFill>
+                    <a:schemeClr val="accent2"/>
+                  </a:solidFill>
+                </a:rPr>
+                <a:t>X FPGA</a:t>
+              </a:r>
+              <a:endParaRPr lang="en-US" dirty="0">
+                <a:solidFill>
+                  <a:schemeClr val="accent2"/>
+                </a:solidFill>
+              </a:endParaRPr>
+            </a:p>
+          </p:txBody>
+        </p:sp>
+        <p:sp>
+          <p:nvSpPr>
+            <p:cNvPr id="6" name="Rectangle 5"/>
+            <p:cNvSpPr/>
+            <p:nvPr/>
+          </p:nvSpPr>
+          <p:spPr>
+            <a:xfrm>
+              <a:off x="339713" y="560471"/>
+              <a:ext cx="1266838" cy="863600"/>
+            </a:xfrm>
+            <a:prstGeom prst="rect">
+              <a:avLst/>
+            </a:prstGeom>
+            <a:solidFill>
+              <a:schemeClr val="bg1"/>
+            </a:solidFill>
+            <a:ln w="28575">
+              <a:solidFill>
+                <a:schemeClr val="accent6"/>
+              </a:solidFill>
+            </a:ln>
+          </p:spPr>
+          <p:style>
+            <a:lnRef idx="2">
+              <a:schemeClr val="accent1">
+                <a:shade val="50000"/>
+              </a:schemeClr>
+            </a:lnRef>
+            <a:fillRef idx="1">
+              <a:schemeClr val="accent1"/>
+            </a:fillRef>
+            <a:effectRef idx="0">
+              <a:schemeClr val="accent1"/>
+            </a:effectRef>
+            <a:fontRef idx="minor">
+              <a:schemeClr val="lt1"/>
+            </a:fontRef>
+          </p:style>
+          <p:txBody>
+            <a:bodyPr rtlCol="0" anchor="ctr"/>
+            <a:lstStyle/>
+            <a:p>
+              <a:pPr algn="ctr"/>
+              <a:r>
+                <a:rPr lang="en-US" dirty="0" smtClean="0">
+                  <a:solidFill>
+                    <a:schemeClr val="accent6"/>
+                  </a:solidFill>
+                </a:rPr>
+                <a:t>CONFIG</a:t>
+              </a:r>
+            </a:p>
+            <a:p>
+              <a:pPr algn="ctr"/>
+              <a:r>
+                <a:rPr lang="en-US" dirty="0" smtClean="0">
+                  <a:solidFill>
+                    <a:schemeClr val="accent6"/>
+                  </a:solidFill>
+                </a:rPr>
+                <a:t>FPGA</a:t>
+              </a:r>
+              <a:endParaRPr lang="en-US" dirty="0">
+                <a:solidFill>
+                  <a:schemeClr val="accent6"/>
+                </a:solidFill>
+              </a:endParaRPr>
+            </a:p>
+          </p:txBody>
+        </p:sp>
+        <p:sp>
+          <p:nvSpPr>
+            <p:cNvPr id="8" name="Rectangle 7"/>
+            <p:cNvSpPr/>
+            <p:nvPr/>
+          </p:nvSpPr>
+          <p:spPr>
+            <a:xfrm>
+              <a:off x="339713" y="4383171"/>
+              <a:ext cx="5378147" cy="442829"/>
+            </a:xfrm>
+            <a:prstGeom prst="rect">
+              <a:avLst/>
+            </a:prstGeom>
+            <a:solidFill>
+              <a:schemeClr val="bg1"/>
+            </a:solidFill>
+            <a:ln w="28575">
+              <a:solidFill>
+                <a:schemeClr val="accent1"/>
+              </a:solidFill>
+            </a:ln>
+          </p:spPr>
+          <p:style>
+            <a:lnRef idx="2">
+              <a:schemeClr val="accent1">
+                <a:shade val="50000"/>
+              </a:schemeClr>
+            </a:lnRef>
+            <a:fillRef idx="1">
+              <a:schemeClr val="accent1"/>
+            </a:fillRef>
+            <a:effectRef idx="0">
+              <a:schemeClr val="accent1"/>
+            </a:effectRef>
+            <a:fontRef idx="minor">
+              <a:schemeClr val="lt1"/>
+            </a:fontRef>
+          </p:style>
+          <p:txBody>
+            <a:bodyPr rtlCol="0" anchor="ctr"/>
+            <a:lstStyle/>
+            <a:p>
+              <a:pPr algn="ctr"/>
+              <a:r>
+                <a:rPr lang="en-US" dirty="0" smtClean="0">
+                  <a:solidFill>
+                    <a:schemeClr val="accent1"/>
+                  </a:solidFill>
+                </a:rPr>
+                <a:t>COPPER SUICIDE CONNECTOR J2</a:t>
+              </a:r>
+              <a:endParaRPr lang="en-US" dirty="0">
+                <a:solidFill>
+                  <a:schemeClr val="accent1"/>
+                </a:solidFill>
+              </a:endParaRPr>
+            </a:p>
+          </p:txBody>
+        </p:sp>
+        <p:sp>
+          <p:nvSpPr>
+            <p:cNvPr id="9" name="Rectangle 8"/>
+            <p:cNvSpPr/>
+            <p:nvPr/>
+          </p:nvSpPr>
+          <p:spPr>
+            <a:xfrm>
+              <a:off x="6442063" y="4383171"/>
+              <a:ext cx="5378147" cy="442829"/>
+            </a:xfrm>
+            <a:prstGeom prst="rect">
+              <a:avLst/>
+            </a:prstGeom>
+            <a:solidFill>
+              <a:schemeClr val="bg1"/>
+            </a:solidFill>
+            <a:ln w="28575">
+              <a:solidFill>
+                <a:schemeClr val="accent1"/>
+              </a:solidFill>
+            </a:ln>
+          </p:spPr>
+          <p:style>
+            <a:lnRef idx="2">
+              <a:schemeClr val="accent1">
+                <a:shade val="50000"/>
+              </a:schemeClr>
+            </a:lnRef>
+            <a:fillRef idx="1">
+              <a:schemeClr val="accent1"/>
+            </a:fillRef>
+            <a:effectRef idx="0">
+              <a:schemeClr val="accent1"/>
+            </a:effectRef>
+            <a:fontRef idx="minor">
+              <a:schemeClr val="lt1"/>
+            </a:fontRef>
+          </p:style>
+          <p:txBody>
+            <a:bodyPr rtlCol="0" anchor="ctr"/>
+            <a:lstStyle/>
+            <a:p>
+              <a:pPr algn="ctr"/>
+              <a:r>
+                <a:rPr lang="en-US" dirty="0" smtClean="0">
+                  <a:solidFill>
+                    <a:schemeClr val="accent1"/>
+                  </a:solidFill>
+                </a:rPr>
+                <a:t>COPPER SUICIDE CONNECTOR J1</a:t>
+              </a:r>
+              <a:endParaRPr lang="en-US" dirty="0">
+                <a:solidFill>
+                  <a:schemeClr val="accent1"/>
+                </a:solidFill>
+              </a:endParaRPr>
+            </a:p>
+          </p:txBody>
+        </p:sp>
+        <p:sp>
+          <p:nvSpPr>
+            <p:cNvPr id="10" name="Rectangle 9"/>
+            <p:cNvSpPr/>
+            <p:nvPr/>
+          </p:nvSpPr>
+          <p:spPr>
+            <a:xfrm>
+              <a:off x="4619111" y="2224268"/>
+              <a:ext cx="2406977" cy="639679"/>
+            </a:xfrm>
+            <a:prstGeom prst="rect">
+              <a:avLst/>
+            </a:prstGeom>
+            <a:solidFill>
+              <a:schemeClr val="bg1"/>
+            </a:solidFill>
+            <a:ln w="28575">
+              <a:solidFill>
+                <a:srgbClr val="7030A0"/>
+              </a:solidFill>
+            </a:ln>
+          </p:spPr>
+          <p:style>
+            <a:lnRef idx="2">
+              <a:schemeClr val="accent1">
+                <a:shade val="50000"/>
+              </a:schemeClr>
+            </a:lnRef>
+            <a:fillRef idx="1">
+              <a:schemeClr val="accent1"/>
+            </a:fillRef>
+            <a:effectRef idx="0">
+              <a:schemeClr val="accent1"/>
+            </a:effectRef>
+            <a:fontRef idx="minor">
+              <a:schemeClr val="lt1"/>
+            </a:fontRef>
+          </p:style>
+          <p:txBody>
+            <a:bodyPr rtlCol="0" anchor="ctr"/>
+            <a:lstStyle/>
+            <a:p>
+              <a:pPr algn="ctr"/>
+              <a:r>
+                <a:rPr lang="en-US" dirty="0">
+                  <a:solidFill>
+                    <a:srgbClr val="7030A0"/>
+                  </a:solidFill>
+                </a:rPr>
+                <a:t>R</a:t>
+              </a:r>
+              <a:r>
+                <a:rPr lang="en-US" dirty="0" smtClean="0">
+                  <a:solidFill>
+                    <a:srgbClr val="7030A0"/>
+                  </a:solidFill>
+                </a:rPr>
+                <a:t>X FPGA</a:t>
+              </a:r>
+              <a:endParaRPr lang="en-US" dirty="0">
+                <a:solidFill>
+                  <a:srgbClr val="7030A0"/>
+                </a:solidFill>
+              </a:endParaRPr>
+            </a:p>
+          </p:txBody>
+        </p:sp>
+        <p:sp>
+          <p:nvSpPr>
+            <p:cNvPr id="11" name="Rectangle 10"/>
+            <p:cNvSpPr/>
+            <p:nvPr/>
+          </p:nvSpPr>
+          <p:spPr>
+            <a:xfrm>
+              <a:off x="8214641" y="2224268"/>
+              <a:ext cx="2406977" cy="639679"/>
+            </a:xfrm>
+            <a:prstGeom prst="rect">
+              <a:avLst/>
+            </a:prstGeom>
+            <a:solidFill>
+              <a:schemeClr val="bg1"/>
+            </a:solidFill>
+            <a:ln w="28575">
+              <a:solidFill>
+                <a:srgbClr val="C00000"/>
+              </a:solidFill>
+            </a:ln>
+          </p:spPr>
+          <p:style>
+            <a:lnRef idx="2">
+              <a:schemeClr val="accent1">
+                <a:shade val="50000"/>
+              </a:schemeClr>
+            </a:lnRef>
+            <a:fillRef idx="1">
+              <a:schemeClr val="accent1"/>
+            </a:fillRef>
+            <a:effectRef idx="0">
+              <a:schemeClr val="accent1"/>
+            </a:effectRef>
+            <a:fontRef idx="minor">
+              <a:schemeClr val="lt1"/>
+            </a:fontRef>
+          </p:style>
+          <p:txBody>
+            <a:bodyPr rtlCol="0" anchor="ctr"/>
+            <a:lstStyle/>
+            <a:p>
+              <a:pPr algn="ctr"/>
+              <a:r>
+                <a:rPr lang="en-US" dirty="0" smtClean="0">
+                  <a:solidFill>
+                    <a:srgbClr val="C00000"/>
+                  </a:solidFill>
+                </a:rPr>
+                <a:t>ETHERNET FPGA</a:t>
+              </a:r>
+              <a:endParaRPr lang="en-US" dirty="0">
+                <a:solidFill>
+                  <a:srgbClr val="C00000"/>
+                </a:solidFill>
+              </a:endParaRPr>
+            </a:p>
+          </p:txBody>
+        </p:sp>
+        <p:sp>
+          <p:nvSpPr>
+            <p:cNvPr id="12" name="Rectangle 11"/>
+            <p:cNvSpPr/>
+            <p:nvPr/>
+          </p:nvSpPr>
+          <p:spPr>
+            <a:xfrm>
+              <a:off x="598458" y="1444792"/>
+              <a:ext cx="422287" cy="203200"/>
+            </a:xfrm>
+            <a:prstGeom prst="rect">
+              <a:avLst/>
+            </a:prstGeom>
+            <a:solidFill>
+              <a:schemeClr val="bg1"/>
+            </a:solidFill>
+            <a:ln>
+              <a:solidFill>
+                <a:schemeClr val="tx1"/>
+              </a:solidFill>
+            </a:ln>
+          </p:spPr>
+          <p:style>
+            <a:lnRef idx="2">
+              <a:schemeClr val="accent1">
+                <a:shade val="50000"/>
+              </a:schemeClr>
+            </a:lnRef>
+            <a:fillRef idx="1">
+              <a:schemeClr val="accent1"/>
+            </a:fillRef>
+            <a:effectRef idx="0">
+              <a:schemeClr val="accent1"/>
+            </a:effectRef>
+            <a:fontRef idx="minor">
+              <a:schemeClr val="lt1"/>
+            </a:fontRef>
+          </p:style>
+          <p:txBody>
+            <a:bodyPr rtlCol="0" anchor="ctr"/>
+            <a:lstStyle/>
+            <a:p>
+              <a:pPr algn="ctr"/>
+              <a:r>
+                <a:rPr lang="en-US" sz="900" dirty="0" smtClean="0">
+                  <a:solidFill>
+                    <a:schemeClr val="tx1"/>
+                  </a:solidFill>
+                </a:rPr>
+                <a:t>JTAG</a:t>
+              </a:r>
+              <a:endParaRPr lang="en-US" sz="900" dirty="0">
+                <a:solidFill>
+                  <a:schemeClr val="tx1"/>
+                </a:solidFill>
+              </a:endParaRPr>
+            </a:p>
+          </p:txBody>
+        </p:sp>
+        <p:sp>
+          <p:nvSpPr>
+            <p:cNvPr id="13" name="Rectangle 12"/>
+            <p:cNvSpPr/>
+            <p:nvPr/>
+          </p:nvSpPr>
+          <p:spPr>
+            <a:xfrm>
+              <a:off x="3433394" y="2224268"/>
+              <a:ext cx="422287" cy="203200"/>
+            </a:xfrm>
+            <a:prstGeom prst="rect">
+              <a:avLst/>
+            </a:prstGeom>
+            <a:solidFill>
+              <a:schemeClr val="bg1"/>
+            </a:solidFill>
+            <a:ln>
+              <a:solidFill>
+                <a:schemeClr val="tx1"/>
+              </a:solidFill>
+            </a:ln>
+          </p:spPr>
+          <p:style>
+            <a:lnRef idx="2">
+              <a:schemeClr val="accent1">
+                <a:shade val="50000"/>
+              </a:schemeClr>
+            </a:lnRef>
+            <a:fillRef idx="1">
+              <a:schemeClr val="accent1"/>
+            </a:fillRef>
+            <a:effectRef idx="0">
+              <a:schemeClr val="accent1"/>
+            </a:effectRef>
+            <a:fontRef idx="minor">
+              <a:schemeClr val="lt1"/>
+            </a:fontRef>
+          </p:style>
+          <p:txBody>
+            <a:bodyPr rtlCol="0" anchor="ctr"/>
+            <a:lstStyle/>
+            <a:p>
+              <a:pPr algn="ctr"/>
+              <a:r>
+                <a:rPr lang="en-US" sz="900" dirty="0" smtClean="0">
+                  <a:solidFill>
+                    <a:schemeClr val="tx1"/>
+                  </a:solidFill>
+                </a:rPr>
+                <a:t>JTAG</a:t>
+              </a:r>
+              <a:endParaRPr lang="en-US" sz="900" dirty="0">
+                <a:solidFill>
+                  <a:schemeClr val="tx1"/>
+                </a:solidFill>
+              </a:endParaRPr>
+            </a:p>
+          </p:txBody>
+        </p:sp>
+        <p:sp>
+          <p:nvSpPr>
+            <p:cNvPr id="14" name="Rectangle 13"/>
+            <p:cNvSpPr/>
+            <p:nvPr/>
+          </p:nvSpPr>
+          <p:spPr>
+            <a:xfrm>
+              <a:off x="7028924" y="2225938"/>
+              <a:ext cx="422287" cy="203200"/>
+            </a:xfrm>
+            <a:prstGeom prst="rect">
+              <a:avLst/>
+            </a:prstGeom>
+            <a:solidFill>
+              <a:schemeClr val="bg1"/>
+            </a:solidFill>
+            <a:ln>
+              <a:solidFill>
+                <a:schemeClr val="tx1"/>
+              </a:solidFill>
+            </a:ln>
+          </p:spPr>
+          <p:style>
+            <a:lnRef idx="2">
+              <a:schemeClr val="accent1">
+                <a:shade val="50000"/>
+              </a:schemeClr>
+            </a:lnRef>
+            <a:fillRef idx="1">
+              <a:schemeClr val="accent1"/>
+            </a:fillRef>
+            <a:effectRef idx="0">
+              <a:schemeClr val="accent1"/>
+            </a:effectRef>
+            <a:fontRef idx="minor">
+              <a:schemeClr val="lt1"/>
+            </a:fontRef>
+          </p:style>
+          <p:txBody>
+            <a:bodyPr rtlCol="0" anchor="ctr"/>
+            <a:lstStyle/>
+            <a:p>
+              <a:pPr algn="ctr"/>
+              <a:r>
+                <a:rPr lang="en-US" sz="900" dirty="0" smtClean="0">
+                  <a:solidFill>
+                    <a:schemeClr val="tx1"/>
+                  </a:solidFill>
+                </a:rPr>
+                <a:t>JTAG</a:t>
+              </a:r>
+              <a:endParaRPr lang="en-US" sz="900" dirty="0">
+                <a:solidFill>
+                  <a:schemeClr val="tx1"/>
+                </a:solidFill>
+              </a:endParaRPr>
+            </a:p>
+          </p:txBody>
+        </p:sp>
+        <p:sp>
+          <p:nvSpPr>
+            <p:cNvPr id="15" name="Rectangle 14"/>
+            <p:cNvSpPr/>
+            <p:nvPr/>
+          </p:nvSpPr>
+          <p:spPr>
+            <a:xfrm>
+              <a:off x="1139813" y="133350"/>
+              <a:ext cx="1597037" cy="203200"/>
+            </a:xfrm>
+            <a:prstGeom prst="rect">
+              <a:avLst/>
+            </a:prstGeom>
+            <a:solidFill>
+              <a:schemeClr val="bg1"/>
+            </a:solidFill>
+            <a:ln>
+              <a:solidFill>
+                <a:schemeClr val="tx1"/>
+              </a:solidFill>
+            </a:ln>
+          </p:spPr>
+          <p:style>
+            <a:lnRef idx="2">
+              <a:schemeClr val="accent1">
+                <a:shade val="50000"/>
+              </a:schemeClr>
+            </a:lnRef>
+            <a:fillRef idx="1">
+              <a:schemeClr val="accent1"/>
+            </a:fillRef>
+            <a:effectRef idx="0">
+              <a:schemeClr val="accent1"/>
+            </a:effectRef>
+            <a:fontRef idx="minor">
+              <a:schemeClr val="lt1"/>
+            </a:fontRef>
+          </p:style>
+          <p:txBody>
+            <a:bodyPr rtlCol="0" anchor="ctr"/>
+            <a:lstStyle/>
+            <a:p>
+              <a:pPr algn="ctr"/>
+              <a:r>
+                <a:rPr lang="en-US" sz="900" dirty="0" smtClean="0">
+                  <a:solidFill>
+                    <a:schemeClr val="tx1"/>
+                  </a:solidFill>
+                </a:rPr>
+                <a:t>MAIN JTAG CONNECTOR</a:t>
+              </a:r>
+              <a:endParaRPr lang="en-US" sz="900" dirty="0">
+                <a:solidFill>
+                  <a:schemeClr val="tx1"/>
+                </a:solidFill>
+              </a:endParaRPr>
+            </a:p>
+          </p:txBody>
+        </p:sp>
+        <p:cxnSp>
+          <p:nvCxnSpPr>
+            <p:cNvPr id="17" name="Elbow Connector 16"/>
+            <p:cNvCxnSpPr>
+              <a:stCxn id="12" idx="2"/>
+              <a:endCxn id="34" idx="1"/>
+            </p:cNvCxnSpPr>
+            <p:nvPr/>
+          </p:nvCxnSpPr>
+          <p:spPr>
+            <a:xfrm rot="16200000" flipH="1">
+              <a:off x="552840" y="1904753"/>
+              <a:ext cx="724666" cy="211143"/>
+            </a:xfrm>
+            <a:prstGeom prst="bentConnector2">
+              <a:avLst/>
+            </a:prstGeom>
+            <a:ln w="12700">
+              <a:solidFill>
+                <a:schemeClr val="tx1"/>
+              </a:solidFill>
+              <a:tailEnd type="triangle"/>
+            </a:ln>
+          </p:spPr>
+          <p:style>
+            <a:lnRef idx="1">
+              <a:schemeClr val="accent1"/>
+            </a:lnRef>
+            <a:fillRef idx="0">
+              <a:schemeClr val="accent1"/>
+            </a:fillRef>
+            <a:effectRef idx="0">
+              <a:schemeClr val="accent1"/>
+            </a:effectRef>
+            <a:fontRef idx="minor">
+              <a:schemeClr val="tx1"/>
+            </a:fontRef>
+          </p:style>
+        </p:cxnSp>
+        <p:cxnSp>
+          <p:nvCxnSpPr>
+            <p:cNvPr id="22" name="Straight Arrow Connector 21"/>
+            <p:cNvCxnSpPr>
+              <a:stCxn id="13" idx="3"/>
+            </p:cNvCxnSpPr>
+            <p:nvPr/>
+          </p:nvCxnSpPr>
+          <p:spPr>
+            <a:xfrm>
+              <a:off x="3855681" y="2325868"/>
+              <a:ext cx="763430" cy="0"/>
+            </a:xfrm>
+            <a:prstGeom prst="straightConnector1">
+              <a:avLst/>
+            </a:prstGeom>
+            <a:ln w="12700">
+              <a:solidFill>
+                <a:schemeClr val="tx1"/>
+              </a:solidFill>
+              <a:tailEnd type="triangle"/>
+            </a:ln>
+          </p:spPr>
+          <p:style>
+            <a:lnRef idx="1">
+              <a:schemeClr val="accent1"/>
+            </a:lnRef>
+            <a:fillRef idx="0">
+              <a:schemeClr val="accent1"/>
+            </a:fillRef>
+            <a:effectRef idx="0">
+              <a:schemeClr val="accent1"/>
+            </a:effectRef>
+            <a:fontRef idx="minor">
+              <a:schemeClr val="tx1"/>
+            </a:fontRef>
+          </p:style>
+        </p:cxnSp>
+        <p:cxnSp>
+          <p:nvCxnSpPr>
+            <p:cNvPr id="24" name="Straight Arrow Connector 23"/>
+            <p:cNvCxnSpPr>
+              <a:stCxn id="14" idx="3"/>
+            </p:cNvCxnSpPr>
+            <p:nvPr/>
+          </p:nvCxnSpPr>
+          <p:spPr>
+            <a:xfrm flipV="1">
+              <a:off x="7451211" y="2325868"/>
+              <a:ext cx="763430" cy="1670"/>
+            </a:xfrm>
+            <a:prstGeom prst="straightConnector1">
+              <a:avLst/>
+            </a:prstGeom>
+            <a:ln w="12700">
+              <a:solidFill>
+                <a:schemeClr val="tx1"/>
+              </a:solidFill>
+              <a:tailEnd type="triangle"/>
+            </a:ln>
+          </p:spPr>
+          <p:style>
+            <a:lnRef idx="1">
+              <a:schemeClr val="accent1"/>
+            </a:lnRef>
+            <a:fillRef idx="0">
+              <a:schemeClr val="accent1"/>
+            </a:fillRef>
+            <a:effectRef idx="0">
+              <a:schemeClr val="accent1"/>
+            </a:effectRef>
+            <a:fontRef idx="minor">
+              <a:schemeClr val="tx1"/>
+            </a:fontRef>
+          </p:style>
+        </p:cxnSp>
+        <p:sp>
+          <p:nvSpPr>
+            <p:cNvPr id="25" name="Rectangle 24"/>
+            <p:cNvSpPr/>
+            <p:nvPr/>
+          </p:nvSpPr>
+          <p:spPr>
+            <a:xfrm>
+              <a:off x="10621618" y="2224268"/>
+              <a:ext cx="422287" cy="203200"/>
+            </a:xfrm>
+            <a:prstGeom prst="rect">
+              <a:avLst/>
+            </a:prstGeom>
+            <a:solidFill>
+              <a:schemeClr val="bg1"/>
+            </a:solidFill>
+            <a:ln>
+              <a:solidFill>
+                <a:schemeClr val="tx1"/>
+              </a:solidFill>
+            </a:ln>
+          </p:spPr>
+          <p:style>
+            <a:lnRef idx="2">
+              <a:schemeClr val="accent1">
+                <a:shade val="50000"/>
+              </a:schemeClr>
+            </a:lnRef>
+            <a:fillRef idx="1">
+              <a:schemeClr val="accent1"/>
+            </a:fillRef>
+            <a:effectRef idx="0">
+              <a:schemeClr val="accent1"/>
+            </a:effectRef>
+            <a:fontRef idx="minor">
+              <a:schemeClr val="lt1"/>
+            </a:fontRef>
+          </p:style>
+          <p:txBody>
+            <a:bodyPr rtlCol="0" anchor="ctr"/>
+            <a:lstStyle/>
+            <a:p>
+              <a:pPr algn="ctr"/>
+              <a:r>
+                <a:rPr lang="en-US" sz="900" dirty="0" smtClean="0">
+                  <a:solidFill>
+                    <a:schemeClr val="tx1"/>
+                  </a:solidFill>
+                </a:rPr>
+                <a:t>JTAG</a:t>
+              </a:r>
+              <a:endParaRPr lang="en-US" sz="900" dirty="0">
+                <a:solidFill>
+                  <a:schemeClr val="tx1"/>
+                </a:solidFill>
+              </a:endParaRPr>
+            </a:p>
+          </p:txBody>
+        </p:sp>
+        <p:cxnSp>
+          <p:nvCxnSpPr>
+            <p:cNvPr id="27" name="Straight Arrow Connector 26"/>
+            <p:cNvCxnSpPr>
+              <a:stCxn id="25" idx="2"/>
+            </p:cNvCxnSpPr>
+            <p:nvPr/>
+          </p:nvCxnSpPr>
+          <p:spPr>
+            <a:xfrm>
+              <a:off x="10832762" y="2427468"/>
+              <a:ext cx="0" cy="1955700"/>
+            </a:xfrm>
+            <a:prstGeom prst="straightConnector1">
+              <a:avLst/>
+            </a:prstGeom>
+            <a:ln w="12700">
+              <a:solidFill>
+                <a:schemeClr val="tx1"/>
+              </a:solidFill>
+              <a:tailEnd type="triangle"/>
+            </a:ln>
+          </p:spPr>
+          <p:style>
+            <a:lnRef idx="1">
+              <a:schemeClr val="accent1"/>
+            </a:lnRef>
+            <a:fillRef idx="0">
+              <a:schemeClr val="accent1"/>
+            </a:fillRef>
+            <a:effectRef idx="0">
+              <a:schemeClr val="accent1"/>
+            </a:effectRef>
+            <a:fontRef idx="minor">
+              <a:schemeClr val="tx1"/>
+            </a:fontRef>
+          </p:style>
+        </p:cxnSp>
+        <p:cxnSp>
+          <p:nvCxnSpPr>
+            <p:cNvPr id="32" name="Elbow Connector 31"/>
+            <p:cNvCxnSpPr>
+              <a:stCxn id="30" idx="0"/>
+              <a:endCxn id="15" idx="3"/>
+            </p:cNvCxnSpPr>
+            <p:nvPr/>
+          </p:nvCxnSpPr>
+          <p:spPr>
+            <a:xfrm rot="16200000" flipV="1">
+              <a:off x="5132506" y="-2160705"/>
+              <a:ext cx="4148219" cy="8939529"/>
+            </a:xfrm>
+            <a:prstGeom prst="bentConnector2">
+              <a:avLst/>
+            </a:prstGeom>
+            <a:ln w="12700">
+              <a:solidFill>
+                <a:schemeClr val="tx1"/>
+              </a:solidFill>
+              <a:tailEnd type="triangle"/>
+            </a:ln>
+          </p:spPr>
+          <p:style>
+            <a:lnRef idx="1">
+              <a:schemeClr val="accent1"/>
+            </a:lnRef>
+            <a:fillRef idx="0">
+              <a:schemeClr val="accent1"/>
+            </a:fillRef>
+            <a:effectRef idx="0">
+              <a:schemeClr val="accent1"/>
+            </a:effectRef>
+            <a:fontRef idx="minor">
+              <a:schemeClr val="tx1"/>
+            </a:fontRef>
+          </p:style>
+        </p:cxnSp>
+        <p:cxnSp>
+          <p:nvCxnSpPr>
+            <p:cNvPr id="38" name="Straight Connector 37"/>
+            <p:cNvCxnSpPr/>
+            <p:nvPr/>
+          </p:nvCxnSpPr>
+          <p:spPr>
+            <a:xfrm>
+              <a:off x="3430558" y="2724248"/>
+              <a:ext cx="1188553" cy="0"/>
+            </a:xfrm>
+            <a:prstGeom prst="line">
+              <a:avLst/>
+            </a:prstGeom>
+            <a:ln w="19050">
+              <a:solidFill>
+                <a:schemeClr val="tx1"/>
+              </a:solidFill>
+            </a:ln>
+          </p:spPr>
+          <p:style>
+            <a:lnRef idx="1">
+              <a:schemeClr val="accent1"/>
+            </a:lnRef>
+            <a:fillRef idx="0">
+              <a:schemeClr val="accent1"/>
+            </a:fillRef>
+            <a:effectRef idx="0">
+              <a:schemeClr val="accent1"/>
+            </a:effectRef>
+            <a:fontRef idx="minor">
+              <a:schemeClr val="tx1"/>
+            </a:fontRef>
+          </p:style>
+        </p:cxnSp>
+        <p:sp>
+          <p:nvSpPr>
+            <p:cNvPr id="39" name="TextBox 38"/>
+            <p:cNvSpPr txBox="1"/>
+            <p:nvPr/>
+          </p:nvSpPr>
+          <p:spPr>
+            <a:xfrm>
+              <a:off x="3601546" y="2493308"/>
+              <a:ext cx="806631" cy="307777"/>
+            </a:xfrm>
+            <a:prstGeom prst="rect">
+              <a:avLst/>
+            </a:prstGeom>
+            <a:noFill/>
+          </p:spPr>
+          <p:txBody>
+            <a:bodyPr wrap="none" rtlCol="0">
+              <a:spAutoFit/>
+            </a:bodyPr>
+            <a:lstStyle/>
+            <a:p>
+              <a:r>
+                <a:rPr lang="en-US" sz="1400" dirty="0" smtClean="0"/>
+                <a:t>GPIO    8</a:t>
+              </a:r>
+              <a:endParaRPr lang="en-US" sz="1400" dirty="0"/>
+            </a:p>
+          </p:txBody>
+        </p:sp>
+        <p:cxnSp>
+          <p:nvCxnSpPr>
+            <p:cNvPr id="41" name="Straight Connector 40"/>
+            <p:cNvCxnSpPr/>
+            <p:nvPr/>
+          </p:nvCxnSpPr>
+          <p:spPr>
+            <a:xfrm flipV="1">
+              <a:off x="4086026" y="2679797"/>
+              <a:ext cx="88901" cy="88901"/>
+            </a:xfrm>
+            <a:prstGeom prst="line">
+              <a:avLst/>
+            </a:prstGeom>
+            <a:ln>
+              <a:solidFill>
+                <a:schemeClr val="tx1"/>
+              </a:solidFill>
+            </a:ln>
+          </p:spPr>
+          <p:style>
+            <a:lnRef idx="1">
+              <a:schemeClr val="accent1"/>
+            </a:lnRef>
+            <a:fillRef idx="0">
+              <a:schemeClr val="accent1"/>
+            </a:fillRef>
+            <a:effectRef idx="0">
+              <a:schemeClr val="accent1"/>
+            </a:effectRef>
+            <a:fontRef idx="minor">
+              <a:schemeClr val="tx1"/>
+            </a:fontRef>
+          </p:style>
+        </p:cxnSp>
+        <p:cxnSp>
+          <p:nvCxnSpPr>
+            <p:cNvPr id="44" name="Elbow Connector 43"/>
+            <p:cNvCxnSpPr>
+              <a:stCxn id="15" idx="1"/>
+              <a:endCxn id="42" idx="0"/>
+            </p:cNvCxnSpPr>
+            <p:nvPr/>
+          </p:nvCxnSpPr>
+          <p:spPr>
+            <a:xfrm rot="10800000" flipV="1">
+              <a:off x="809601" y="234949"/>
+              <a:ext cx="330212" cy="339223"/>
+            </a:xfrm>
+            <a:prstGeom prst="bentConnector2">
+              <a:avLst/>
+            </a:prstGeom>
+            <a:ln w="12700">
+              <a:solidFill>
+                <a:schemeClr val="tx1"/>
+              </a:solidFill>
+              <a:tailEnd type="triangle"/>
+            </a:ln>
+          </p:spPr>
+          <p:style>
+            <a:lnRef idx="1">
+              <a:schemeClr val="accent1"/>
+            </a:lnRef>
+            <a:fillRef idx="0">
+              <a:schemeClr val="accent1"/>
+            </a:fillRef>
+            <a:effectRef idx="0">
+              <a:schemeClr val="accent1"/>
+            </a:effectRef>
+            <a:fontRef idx="minor">
+              <a:schemeClr val="tx1"/>
+            </a:fontRef>
+          </p:style>
+        </p:cxnSp>
+        <p:cxnSp>
+          <p:nvCxnSpPr>
+            <p:cNvPr id="46" name="Straight Connector 45"/>
+            <p:cNvCxnSpPr/>
+            <p:nvPr/>
+          </p:nvCxnSpPr>
+          <p:spPr>
+            <a:xfrm>
+              <a:off x="8680450" y="2863947"/>
+              <a:ext cx="0" cy="1519224"/>
+            </a:xfrm>
+            <a:prstGeom prst="line">
+              <a:avLst/>
+            </a:prstGeom>
+            <a:ln w="57150">
+              <a:solidFill>
+                <a:srgbClr val="C00000"/>
+              </a:solidFill>
+            </a:ln>
+          </p:spPr>
+          <p:style>
+            <a:lnRef idx="1">
+              <a:schemeClr val="accent1"/>
+            </a:lnRef>
+            <a:fillRef idx="0">
+              <a:schemeClr val="accent1"/>
+            </a:fillRef>
+            <a:effectRef idx="0">
+              <a:schemeClr val="accent1"/>
+            </a:effectRef>
+            <a:fontRef idx="minor">
+              <a:schemeClr val="tx1"/>
+            </a:fontRef>
+          </p:style>
+        </p:cxnSp>
+        <p:cxnSp>
+          <p:nvCxnSpPr>
+            <p:cNvPr id="49" name="Straight Connector 48"/>
+            <p:cNvCxnSpPr/>
+            <p:nvPr/>
+          </p:nvCxnSpPr>
+          <p:spPr>
+            <a:xfrm>
+              <a:off x="1549400" y="2863947"/>
+              <a:ext cx="0" cy="1519224"/>
+            </a:xfrm>
+            <a:prstGeom prst="line">
+              <a:avLst/>
+            </a:prstGeom>
+            <a:ln w="57150">
+              <a:solidFill>
+                <a:schemeClr val="accent2"/>
+              </a:solidFill>
+            </a:ln>
+          </p:spPr>
+          <p:style>
+            <a:lnRef idx="1">
+              <a:schemeClr val="accent1"/>
+            </a:lnRef>
+            <a:fillRef idx="0">
+              <a:schemeClr val="accent1"/>
+            </a:fillRef>
+            <a:effectRef idx="0">
+              <a:schemeClr val="accent1"/>
+            </a:effectRef>
+            <a:fontRef idx="minor">
+              <a:schemeClr val="tx1"/>
+            </a:fontRef>
+          </p:style>
+        </p:cxnSp>
+        <p:cxnSp>
+          <p:nvCxnSpPr>
+            <p:cNvPr id="50" name="Straight Connector 49"/>
+            <p:cNvCxnSpPr/>
+            <p:nvPr/>
+          </p:nvCxnSpPr>
+          <p:spPr>
+            <a:xfrm>
+              <a:off x="2279650" y="2863947"/>
+              <a:ext cx="0" cy="1519224"/>
+            </a:xfrm>
+            <a:prstGeom prst="line">
+              <a:avLst/>
+            </a:prstGeom>
+            <a:ln w="57150">
+              <a:solidFill>
+                <a:schemeClr val="accent2"/>
+              </a:solidFill>
+            </a:ln>
+          </p:spPr>
+          <p:style>
+            <a:lnRef idx="1">
+              <a:schemeClr val="accent1"/>
+            </a:lnRef>
+            <a:fillRef idx="0">
+              <a:schemeClr val="accent1"/>
+            </a:fillRef>
+            <a:effectRef idx="0">
+              <a:schemeClr val="accent1"/>
+            </a:effectRef>
+            <a:fontRef idx="minor">
+              <a:schemeClr val="tx1"/>
+            </a:fontRef>
+          </p:style>
+        </p:cxnSp>
+        <p:cxnSp>
+          <p:nvCxnSpPr>
+            <p:cNvPr id="51" name="Straight Connector 50"/>
+            <p:cNvCxnSpPr/>
+            <p:nvPr/>
+          </p:nvCxnSpPr>
+          <p:spPr>
+            <a:xfrm>
+              <a:off x="4787900" y="2863947"/>
+              <a:ext cx="0" cy="1519224"/>
+            </a:xfrm>
+            <a:prstGeom prst="line">
+              <a:avLst/>
+            </a:prstGeom>
+            <a:ln w="57150">
+              <a:solidFill>
+                <a:srgbClr val="7030A0"/>
+              </a:solidFill>
+            </a:ln>
+          </p:spPr>
+          <p:style>
+            <a:lnRef idx="1">
+              <a:schemeClr val="accent1"/>
+            </a:lnRef>
+            <a:fillRef idx="0">
+              <a:schemeClr val="accent1"/>
+            </a:fillRef>
+            <a:effectRef idx="0">
+              <a:schemeClr val="accent1"/>
+            </a:effectRef>
+            <a:fontRef idx="minor">
+              <a:schemeClr val="tx1"/>
+            </a:fontRef>
+          </p:style>
+        </p:cxnSp>
+        <p:cxnSp>
+          <p:nvCxnSpPr>
+            <p:cNvPr id="52" name="Straight Connector 51"/>
+            <p:cNvCxnSpPr/>
+            <p:nvPr/>
+          </p:nvCxnSpPr>
+          <p:spPr>
+            <a:xfrm>
+              <a:off x="5505450" y="2863947"/>
+              <a:ext cx="0" cy="1519224"/>
+            </a:xfrm>
+            <a:prstGeom prst="line">
+              <a:avLst/>
+            </a:prstGeom>
+            <a:ln w="57150">
+              <a:solidFill>
+                <a:srgbClr val="7030A0"/>
+              </a:solidFill>
+            </a:ln>
+          </p:spPr>
+          <p:style>
+            <a:lnRef idx="1">
+              <a:schemeClr val="accent1"/>
+            </a:lnRef>
+            <a:fillRef idx="0">
+              <a:schemeClr val="accent1"/>
+            </a:fillRef>
+            <a:effectRef idx="0">
+              <a:schemeClr val="accent1"/>
+            </a:effectRef>
+            <a:fontRef idx="minor">
+              <a:schemeClr val="tx1"/>
+            </a:fontRef>
+          </p:style>
+        </p:cxnSp>
+        <p:sp>
+          <p:nvSpPr>
+            <p:cNvPr id="53" name="TextBox 52"/>
+            <p:cNvSpPr txBox="1"/>
+            <p:nvPr/>
+          </p:nvSpPr>
+          <p:spPr>
+            <a:xfrm rot="16200000">
+              <a:off x="998244" y="3377546"/>
+              <a:ext cx="846707" cy="307777"/>
+            </a:xfrm>
+            <a:prstGeom prst="rect">
+              <a:avLst/>
+            </a:prstGeom>
+            <a:noFill/>
+          </p:spPr>
+          <p:txBody>
+            <a:bodyPr wrap="none" rtlCol="0">
+              <a:spAutoFit/>
+            </a:bodyPr>
+            <a:lstStyle/>
+            <a:p>
+              <a:r>
+                <a:rPr lang="en-US" sz="1400" dirty="0" smtClean="0">
+                  <a:solidFill>
+                    <a:schemeClr val="accent2"/>
+                  </a:solidFill>
+                </a:rPr>
+                <a:t>DDR    47</a:t>
+              </a:r>
+              <a:endParaRPr lang="en-US" sz="1400" dirty="0">
+                <a:solidFill>
+                  <a:schemeClr val="accent2"/>
+                </a:solidFill>
+              </a:endParaRPr>
+            </a:p>
+          </p:txBody>
+        </p:sp>
+        <p:cxnSp>
+          <p:nvCxnSpPr>
+            <p:cNvPr id="55" name="Straight Connector 54"/>
+            <p:cNvCxnSpPr/>
+            <p:nvPr/>
+          </p:nvCxnSpPr>
+          <p:spPr>
+            <a:xfrm flipH="1" flipV="1">
+              <a:off x="1495583" y="3426996"/>
+              <a:ext cx="104439" cy="104439"/>
+            </a:xfrm>
+            <a:prstGeom prst="line">
+              <a:avLst/>
+            </a:prstGeom>
+            <a:ln>
+              <a:solidFill>
+                <a:schemeClr val="accent2"/>
+              </a:solidFill>
+            </a:ln>
+          </p:spPr>
+          <p:style>
+            <a:lnRef idx="1">
+              <a:schemeClr val="accent1"/>
+            </a:lnRef>
+            <a:fillRef idx="0">
+              <a:schemeClr val="accent1"/>
+            </a:fillRef>
+            <a:effectRef idx="0">
+              <a:schemeClr val="accent1"/>
+            </a:effectRef>
+            <a:fontRef idx="minor">
+              <a:schemeClr val="tx1"/>
+            </a:fontRef>
+          </p:style>
+        </p:cxnSp>
+        <p:sp>
+          <p:nvSpPr>
+            <p:cNvPr id="59" name="TextBox 58"/>
+            <p:cNvSpPr txBox="1"/>
+            <p:nvPr/>
+          </p:nvSpPr>
+          <p:spPr>
+            <a:xfrm rot="16200000">
+              <a:off x="1740382" y="3377547"/>
+              <a:ext cx="817853" cy="307777"/>
+            </a:xfrm>
+            <a:prstGeom prst="rect">
+              <a:avLst/>
+            </a:prstGeom>
+            <a:noFill/>
+          </p:spPr>
+          <p:txBody>
+            <a:bodyPr wrap="none" rtlCol="0">
+              <a:spAutoFit/>
+            </a:bodyPr>
+            <a:lstStyle/>
+            <a:p>
+              <a:r>
+                <a:rPr lang="en-US" sz="1400" dirty="0" smtClean="0">
+                  <a:solidFill>
+                    <a:schemeClr val="accent2"/>
+                  </a:solidFill>
+                </a:rPr>
+                <a:t>SDR    23</a:t>
+              </a:r>
+              <a:endParaRPr lang="en-US" sz="1400" dirty="0">
+                <a:solidFill>
+                  <a:schemeClr val="accent2"/>
+                </a:solidFill>
+              </a:endParaRPr>
+            </a:p>
+          </p:txBody>
+        </p:sp>
+        <p:cxnSp>
+          <p:nvCxnSpPr>
+            <p:cNvPr id="60" name="Straight Connector 59"/>
+            <p:cNvCxnSpPr/>
+            <p:nvPr/>
+          </p:nvCxnSpPr>
+          <p:spPr>
+            <a:xfrm flipH="1" flipV="1">
+              <a:off x="2223294" y="3426997"/>
+              <a:ext cx="104439" cy="104439"/>
+            </a:xfrm>
+            <a:prstGeom prst="line">
+              <a:avLst/>
+            </a:prstGeom>
+            <a:ln>
+              <a:solidFill>
+                <a:schemeClr val="accent2"/>
+              </a:solidFill>
+            </a:ln>
+          </p:spPr>
+          <p:style>
+            <a:lnRef idx="1">
+              <a:schemeClr val="accent1"/>
+            </a:lnRef>
+            <a:fillRef idx="0">
+              <a:schemeClr val="accent1"/>
+            </a:fillRef>
+            <a:effectRef idx="0">
+              <a:schemeClr val="accent1"/>
+            </a:effectRef>
+            <a:fontRef idx="minor">
+              <a:schemeClr val="tx1"/>
+            </a:fontRef>
+          </p:style>
+        </p:cxnSp>
+        <p:sp>
+          <p:nvSpPr>
+            <p:cNvPr id="61" name="TextBox 60"/>
+            <p:cNvSpPr txBox="1"/>
+            <p:nvPr/>
+          </p:nvSpPr>
+          <p:spPr>
+            <a:xfrm rot="16200000">
+              <a:off x="4241317" y="3377547"/>
+              <a:ext cx="846707" cy="307777"/>
+            </a:xfrm>
+            <a:prstGeom prst="rect">
+              <a:avLst/>
+            </a:prstGeom>
+            <a:noFill/>
+          </p:spPr>
+          <p:txBody>
+            <a:bodyPr wrap="none" rtlCol="0">
+              <a:spAutoFit/>
+            </a:bodyPr>
+            <a:lstStyle/>
+            <a:p>
+              <a:r>
+                <a:rPr lang="en-US" sz="1400" dirty="0" smtClean="0">
+                  <a:solidFill>
+                    <a:srgbClr val="7030A0"/>
+                  </a:solidFill>
+                </a:rPr>
+                <a:t>DDR    47</a:t>
+              </a:r>
+              <a:endParaRPr lang="en-US" sz="1400" dirty="0">
+                <a:solidFill>
+                  <a:srgbClr val="7030A0"/>
+                </a:solidFill>
+              </a:endParaRPr>
+            </a:p>
+          </p:txBody>
+        </p:sp>
+        <p:cxnSp>
+          <p:nvCxnSpPr>
+            <p:cNvPr id="62" name="Straight Connector 61"/>
+            <p:cNvCxnSpPr/>
+            <p:nvPr/>
+          </p:nvCxnSpPr>
+          <p:spPr>
+            <a:xfrm flipH="1" flipV="1">
+              <a:off x="4738656" y="3426997"/>
+              <a:ext cx="104439" cy="104439"/>
+            </a:xfrm>
+            <a:prstGeom prst="line">
+              <a:avLst/>
+            </a:prstGeom>
+            <a:ln>
+              <a:solidFill>
+                <a:srgbClr val="7030A0"/>
+              </a:solidFill>
+            </a:ln>
+          </p:spPr>
+          <p:style>
+            <a:lnRef idx="1">
+              <a:schemeClr val="accent1"/>
+            </a:lnRef>
+            <a:fillRef idx="0">
+              <a:schemeClr val="accent1"/>
+            </a:fillRef>
+            <a:effectRef idx="0">
+              <a:schemeClr val="accent1"/>
+            </a:effectRef>
+            <a:fontRef idx="minor">
+              <a:schemeClr val="tx1"/>
+            </a:fontRef>
+          </p:style>
+        </p:cxnSp>
+        <p:sp>
+          <p:nvSpPr>
+            <p:cNvPr id="63" name="TextBox 62"/>
+            <p:cNvSpPr txBox="1"/>
+            <p:nvPr/>
+          </p:nvSpPr>
+          <p:spPr>
+            <a:xfrm rot="16200000">
+              <a:off x="4969359" y="3377547"/>
+              <a:ext cx="817853" cy="307777"/>
+            </a:xfrm>
+            <a:prstGeom prst="rect">
+              <a:avLst/>
+            </a:prstGeom>
+            <a:noFill/>
+          </p:spPr>
+          <p:txBody>
+            <a:bodyPr wrap="none" rtlCol="0">
+              <a:spAutoFit/>
+            </a:bodyPr>
+            <a:lstStyle/>
+            <a:p>
+              <a:r>
+                <a:rPr lang="en-US" sz="1400" dirty="0" smtClean="0">
+                  <a:solidFill>
+                    <a:srgbClr val="7030A0"/>
+                  </a:solidFill>
+                </a:rPr>
+                <a:t>SDR    23</a:t>
+              </a:r>
+              <a:endParaRPr lang="en-US" sz="1400" dirty="0">
+                <a:solidFill>
+                  <a:srgbClr val="7030A0"/>
+                </a:solidFill>
+              </a:endParaRPr>
+            </a:p>
+          </p:txBody>
+        </p:sp>
+        <p:cxnSp>
+          <p:nvCxnSpPr>
+            <p:cNvPr id="64" name="Straight Connector 63"/>
+            <p:cNvCxnSpPr/>
+            <p:nvPr/>
+          </p:nvCxnSpPr>
+          <p:spPr>
+            <a:xfrm flipH="1" flipV="1">
+              <a:off x="5452271" y="3426997"/>
+              <a:ext cx="104439" cy="104439"/>
+            </a:xfrm>
+            <a:prstGeom prst="line">
+              <a:avLst/>
+            </a:prstGeom>
+            <a:ln>
+              <a:solidFill>
+                <a:srgbClr val="7030A0"/>
+              </a:solidFill>
+            </a:ln>
+          </p:spPr>
+          <p:style>
+            <a:lnRef idx="1">
+              <a:schemeClr val="accent1"/>
+            </a:lnRef>
+            <a:fillRef idx="0">
+              <a:schemeClr val="accent1"/>
+            </a:fillRef>
+            <a:effectRef idx="0">
+              <a:schemeClr val="accent1"/>
+            </a:effectRef>
+            <a:fontRef idx="minor">
+              <a:schemeClr val="tx1"/>
+            </a:fontRef>
+          </p:style>
+        </p:cxnSp>
+        <p:sp>
+          <p:nvSpPr>
+            <p:cNvPr id="65" name="TextBox 64"/>
+            <p:cNvSpPr txBox="1"/>
+            <p:nvPr/>
+          </p:nvSpPr>
+          <p:spPr>
+            <a:xfrm rot="16200000">
+              <a:off x="8140656" y="3377546"/>
+              <a:ext cx="817853" cy="307777"/>
+            </a:xfrm>
+            <a:prstGeom prst="rect">
+              <a:avLst/>
+            </a:prstGeom>
+            <a:noFill/>
+          </p:spPr>
+          <p:txBody>
+            <a:bodyPr wrap="none" rtlCol="0">
+              <a:spAutoFit/>
+            </a:bodyPr>
+            <a:lstStyle/>
+            <a:p>
+              <a:r>
+                <a:rPr lang="en-US" sz="1400" dirty="0" smtClean="0">
+                  <a:solidFill>
+                    <a:srgbClr val="C00000"/>
+                  </a:solidFill>
+                </a:rPr>
+                <a:t>SDR    23</a:t>
+              </a:r>
+              <a:endParaRPr lang="en-US" sz="1400" dirty="0">
+                <a:solidFill>
+                  <a:srgbClr val="C00000"/>
+                </a:solidFill>
+              </a:endParaRPr>
+            </a:p>
+          </p:txBody>
+        </p:sp>
+        <p:cxnSp>
+          <p:nvCxnSpPr>
+            <p:cNvPr id="66" name="Straight Connector 65"/>
+            <p:cNvCxnSpPr/>
+            <p:nvPr/>
+          </p:nvCxnSpPr>
+          <p:spPr>
+            <a:xfrm flipH="1" flipV="1">
+              <a:off x="8630711" y="3426996"/>
+              <a:ext cx="104439" cy="104439"/>
+            </a:xfrm>
+            <a:prstGeom prst="line">
+              <a:avLst/>
+            </a:prstGeom>
+            <a:ln>
+              <a:solidFill>
+                <a:srgbClr val="C00000"/>
+              </a:solidFill>
+            </a:ln>
+          </p:spPr>
+          <p:style>
+            <a:lnRef idx="1">
+              <a:schemeClr val="accent1"/>
+            </a:lnRef>
+            <a:fillRef idx="0">
+              <a:schemeClr val="accent1"/>
+            </a:fillRef>
+            <a:effectRef idx="0">
+              <a:schemeClr val="accent1"/>
+            </a:effectRef>
+            <a:fontRef idx="minor">
+              <a:schemeClr val="tx1"/>
+            </a:fontRef>
+          </p:style>
+        </p:cxnSp>
+        <p:cxnSp>
+          <p:nvCxnSpPr>
+            <p:cNvPr id="67" name="Straight Connector 66"/>
+            <p:cNvCxnSpPr/>
+            <p:nvPr/>
+          </p:nvCxnSpPr>
+          <p:spPr>
+            <a:xfrm>
+              <a:off x="9075498" y="2863947"/>
+              <a:ext cx="0" cy="1519224"/>
+            </a:xfrm>
+            <a:prstGeom prst="line">
+              <a:avLst/>
+            </a:prstGeom>
+            <a:ln w="57150">
+              <a:solidFill>
+                <a:srgbClr val="C00000"/>
+              </a:solidFill>
+            </a:ln>
+          </p:spPr>
+          <p:style>
+            <a:lnRef idx="1">
+              <a:schemeClr val="accent1"/>
+            </a:lnRef>
+            <a:fillRef idx="0">
+              <a:schemeClr val="accent1"/>
+            </a:fillRef>
+            <a:effectRef idx="0">
+              <a:schemeClr val="accent1"/>
+            </a:effectRef>
+            <a:fontRef idx="minor">
+              <a:schemeClr val="tx1"/>
+            </a:fontRef>
+          </p:style>
+        </p:cxnSp>
+        <p:sp>
+          <p:nvSpPr>
+            <p:cNvPr id="68" name="TextBox 67"/>
+            <p:cNvSpPr txBox="1"/>
+            <p:nvPr/>
+          </p:nvSpPr>
+          <p:spPr>
+            <a:xfrm rot="16200000">
+              <a:off x="8521277" y="3377546"/>
+              <a:ext cx="846707" cy="307777"/>
+            </a:xfrm>
+            <a:prstGeom prst="rect">
+              <a:avLst/>
+            </a:prstGeom>
+            <a:noFill/>
+          </p:spPr>
+          <p:txBody>
+            <a:bodyPr wrap="none" rtlCol="0">
+              <a:spAutoFit/>
+            </a:bodyPr>
+            <a:lstStyle/>
+            <a:p>
+              <a:r>
+                <a:rPr lang="en-US" sz="1400" dirty="0" smtClean="0">
+                  <a:solidFill>
+                    <a:srgbClr val="C00000"/>
+                  </a:solidFill>
+                </a:rPr>
+                <a:t>DDR    47</a:t>
+              </a:r>
+              <a:endParaRPr lang="en-US" sz="1400" dirty="0">
+                <a:solidFill>
+                  <a:srgbClr val="C00000"/>
+                </a:solidFill>
+              </a:endParaRPr>
+            </a:p>
+          </p:txBody>
+        </p:sp>
+        <p:cxnSp>
+          <p:nvCxnSpPr>
+            <p:cNvPr id="69" name="Straight Connector 68"/>
+            <p:cNvCxnSpPr/>
+            <p:nvPr/>
+          </p:nvCxnSpPr>
+          <p:spPr>
+            <a:xfrm flipH="1" flipV="1">
+              <a:off x="9025759" y="3426996"/>
+              <a:ext cx="104439" cy="104439"/>
+            </a:xfrm>
+            <a:prstGeom prst="line">
+              <a:avLst/>
+            </a:prstGeom>
+            <a:ln>
+              <a:solidFill>
+                <a:srgbClr val="C00000"/>
+              </a:solidFill>
+            </a:ln>
+          </p:spPr>
+          <p:style>
+            <a:lnRef idx="1">
+              <a:schemeClr val="accent1"/>
+            </a:lnRef>
+            <a:fillRef idx="0">
+              <a:schemeClr val="accent1"/>
+            </a:fillRef>
+            <a:effectRef idx="0">
+              <a:schemeClr val="accent1"/>
+            </a:effectRef>
+            <a:fontRef idx="minor">
+              <a:schemeClr val="tx1"/>
+            </a:fontRef>
+          </p:style>
+        </p:cxnSp>
+        <p:cxnSp>
+          <p:nvCxnSpPr>
+            <p:cNvPr id="70" name="Straight Connector 69"/>
+            <p:cNvCxnSpPr/>
+            <p:nvPr/>
+          </p:nvCxnSpPr>
+          <p:spPr>
+            <a:xfrm>
+              <a:off x="9470546" y="2863947"/>
+              <a:ext cx="0" cy="1519224"/>
+            </a:xfrm>
+            <a:prstGeom prst="line">
+              <a:avLst/>
+            </a:prstGeom>
+            <a:ln w="57150">
+              <a:solidFill>
+                <a:srgbClr val="C00000"/>
+              </a:solidFill>
+            </a:ln>
+          </p:spPr>
+          <p:style>
+            <a:lnRef idx="1">
+              <a:schemeClr val="accent1"/>
+            </a:lnRef>
+            <a:fillRef idx="0">
+              <a:schemeClr val="accent1"/>
+            </a:fillRef>
+            <a:effectRef idx="0">
+              <a:schemeClr val="accent1"/>
+            </a:effectRef>
+            <a:fontRef idx="minor">
+              <a:schemeClr val="tx1"/>
+            </a:fontRef>
+          </p:style>
+        </p:cxnSp>
+        <p:sp>
+          <p:nvSpPr>
+            <p:cNvPr id="71" name="TextBox 70"/>
+            <p:cNvSpPr txBox="1"/>
+            <p:nvPr/>
+          </p:nvSpPr>
+          <p:spPr>
+            <a:xfrm rot="16200000">
+              <a:off x="8930752" y="3377546"/>
+              <a:ext cx="817853" cy="307777"/>
+            </a:xfrm>
+            <a:prstGeom prst="rect">
+              <a:avLst/>
+            </a:prstGeom>
+            <a:noFill/>
+          </p:spPr>
+          <p:txBody>
+            <a:bodyPr wrap="none" rtlCol="0">
+              <a:spAutoFit/>
+            </a:bodyPr>
+            <a:lstStyle/>
+            <a:p>
+              <a:r>
+                <a:rPr lang="en-US" sz="1400" dirty="0" smtClean="0">
+                  <a:solidFill>
+                    <a:srgbClr val="C00000"/>
+                  </a:solidFill>
+                </a:rPr>
+                <a:t>SDR    23</a:t>
+              </a:r>
+              <a:endParaRPr lang="en-US" sz="1400" dirty="0">
+                <a:solidFill>
+                  <a:srgbClr val="C00000"/>
+                </a:solidFill>
+              </a:endParaRPr>
+            </a:p>
+          </p:txBody>
+        </p:sp>
+        <p:cxnSp>
+          <p:nvCxnSpPr>
+            <p:cNvPr id="72" name="Straight Connector 71"/>
+            <p:cNvCxnSpPr/>
+            <p:nvPr/>
+          </p:nvCxnSpPr>
+          <p:spPr>
+            <a:xfrm flipH="1" flipV="1">
+              <a:off x="9420807" y="3426996"/>
+              <a:ext cx="104439" cy="104439"/>
+            </a:xfrm>
+            <a:prstGeom prst="line">
+              <a:avLst/>
+            </a:prstGeom>
+            <a:ln>
+              <a:solidFill>
+                <a:srgbClr val="C00000"/>
+              </a:solidFill>
+            </a:ln>
+          </p:spPr>
+          <p:style>
+            <a:lnRef idx="1">
+              <a:schemeClr val="accent1"/>
+            </a:lnRef>
+            <a:fillRef idx="0">
+              <a:schemeClr val="accent1"/>
+            </a:fillRef>
+            <a:effectRef idx="0">
+              <a:schemeClr val="accent1"/>
+            </a:effectRef>
+            <a:fontRef idx="minor">
+              <a:schemeClr val="tx1"/>
+            </a:fontRef>
+          </p:style>
+        </p:cxnSp>
+        <p:cxnSp>
+          <p:nvCxnSpPr>
+            <p:cNvPr id="73" name="Straight Connector 72"/>
+            <p:cNvCxnSpPr/>
+            <p:nvPr/>
+          </p:nvCxnSpPr>
+          <p:spPr>
+            <a:xfrm>
+              <a:off x="9866435" y="2863947"/>
+              <a:ext cx="0" cy="1519224"/>
+            </a:xfrm>
+            <a:prstGeom prst="line">
+              <a:avLst/>
+            </a:prstGeom>
+            <a:ln w="57150">
+              <a:solidFill>
+                <a:srgbClr val="C00000"/>
+              </a:solidFill>
+            </a:ln>
+          </p:spPr>
+          <p:style>
+            <a:lnRef idx="1">
+              <a:schemeClr val="accent1"/>
+            </a:lnRef>
+            <a:fillRef idx="0">
+              <a:schemeClr val="accent1"/>
+            </a:fillRef>
+            <a:effectRef idx="0">
+              <a:schemeClr val="accent1"/>
+            </a:effectRef>
+            <a:fontRef idx="minor">
+              <a:schemeClr val="tx1"/>
+            </a:fontRef>
+          </p:style>
+        </p:cxnSp>
+        <p:sp>
+          <p:nvSpPr>
+            <p:cNvPr id="74" name="TextBox 73"/>
+            <p:cNvSpPr txBox="1"/>
+            <p:nvPr/>
+          </p:nvSpPr>
+          <p:spPr>
+            <a:xfrm rot="16200000">
+              <a:off x="9312214" y="3377546"/>
+              <a:ext cx="846707" cy="307777"/>
+            </a:xfrm>
+            <a:prstGeom prst="rect">
+              <a:avLst/>
+            </a:prstGeom>
+            <a:noFill/>
+          </p:spPr>
+          <p:txBody>
+            <a:bodyPr wrap="none" rtlCol="0">
+              <a:spAutoFit/>
+            </a:bodyPr>
+            <a:lstStyle/>
+            <a:p>
+              <a:r>
+                <a:rPr lang="en-US" sz="1400" dirty="0" smtClean="0">
+                  <a:solidFill>
+                    <a:srgbClr val="C00000"/>
+                  </a:solidFill>
+                </a:rPr>
+                <a:t>DDR    47</a:t>
+              </a:r>
+              <a:endParaRPr lang="en-US" sz="1400" dirty="0">
+                <a:solidFill>
+                  <a:srgbClr val="C00000"/>
+                </a:solidFill>
+              </a:endParaRPr>
+            </a:p>
+          </p:txBody>
+        </p:sp>
+        <p:cxnSp>
+          <p:nvCxnSpPr>
+            <p:cNvPr id="75" name="Straight Connector 74"/>
+            <p:cNvCxnSpPr/>
+            <p:nvPr/>
+          </p:nvCxnSpPr>
+          <p:spPr>
+            <a:xfrm flipH="1" flipV="1">
+              <a:off x="9816696" y="3426996"/>
+              <a:ext cx="104439" cy="104439"/>
+            </a:xfrm>
+            <a:prstGeom prst="line">
+              <a:avLst/>
+            </a:prstGeom>
+            <a:ln>
+              <a:solidFill>
+                <a:srgbClr val="C00000"/>
+              </a:solidFill>
+            </a:ln>
+          </p:spPr>
+          <p:style>
+            <a:lnRef idx="1">
+              <a:schemeClr val="accent1"/>
+            </a:lnRef>
+            <a:fillRef idx="0">
+              <a:schemeClr val="accent1"/>
+            </a:fillRef>
+            <a:effectRef idx="0">
+              <a:schemeClr val="accent1"/>
+            </a:effectRef>
+            <a:fontRef idx="minor">
+              <a:schemeClr val="tx1"/>
+            </a:fontRef>
+          </p:style>
+        </p:cxnSp>
+        <p:cxnSp>
+          <p:nvCxnSpPr>
+            <p:cNvPr id="77" name="Straight Arrow Connector 76"/>
+            <p:cNvCxnSpPr/>
+            <p:nvPr/>
+          </p:nvCxnSpPr>
+          <p:spPr>
+            <a:xfrm>
+              <a:off x="1172655" y="1432092"/>
+              <a:ext cx="0" cy="786375"/>
+            </a:xfrm>
+            <a:prstGeom prst="straightConnector1">
+              <a:avLst/>
+            </a:prstGeom>
+            <a:ln w="12700">
+              <a:solidFill>
+                <a:schemeClr val="accent6"/>
+              </a:solidFill>
+              <a:tailEnd type="triangle"/>
+            </a:ln>
+          </p:spPr>
+          <p:style>
+            <a:lnRef idx="1">
+              <a:schemeClr val="accent1"/>
+            </a:lnRef>
+            <a:fillRef idx="0">
+              <a:schemeClr val="accent1"/>
+            </a:fillRef>
+            <a:effectRef idx="0">
+              <a:schemeClr val="accent1"/>
+            </a:effectRef>
+            <a:fontRef idx="minor">
+              <a:schemeClr val="tx1"/>
+            </a:fontRef>
+          </p:style>
+        </p:cxnSp>
+        <p:cxnSp>
+          <p:nvCxnSpPr>
+            <p:cNvPr id="89" name="Elbow Connector 88"/>
+            <p:cNvCxnSpPr>
+              <a:stCxn id="81" idx="3"/>
+              <a:endCxn id="86" idx="0"/>
+            </p:cNvCxnSpPr>
+            <p:nvPr/>
+          </p:nvCxnSpPr>
+          <p:spPr>
+            <a:xfrm>
+              <a:off x="1600022" y="1326147"/>
+              <a:ext cx="3318254" cy="906142"/>
+            </a:xfrm>
+            <a:prstGeom prst="bentConnector2">
+              <a:avLst/>
+            </a:prstGeom>
+            <a:ln w="12700">
+              <a:solidFill>
+                <a:schemeClr val="accent6"/>
+              </a:solidFill>
+              <a:tailEnd type="triangle"/>
+            </a:ln>
+          </p:spPr>
+          <p:style>
+            <a:lnRef idx="1">
+              <a:schemeClr val="accent1"/>
+            </a:lnRef>
+            <a:fillRef idx="0">
+              <a:schemeClr val="accent1"/>
+            </a:fillRef>
+            <a:effectRef idx="0">
+              <a:schemeClr val="accent1"/>
+            </a:effectRef>
+            <a:fontRef idx="minor">
+              <a:schemeClr val="tx1"/>
+            </a:fontRef>
+          </p:style>
+        </p:cxnSp>
+        <p:cxnSp>
+          <p:nvCxnSpPr>
+            <p:cNvPr id="92" name="Elbow Connector 91"/>
+            <p:cNvCxnSpPr>
+              <a:stCxn id="82" idx="3"/>
+              <a:endCxn id="87" idx="0"/>
+            </p:cNvCxnSpPr>
+            <p:nvPr/>
+          </p:nvCxnSpPr>
+          <p:spPr>
+            <a:xfrm>
+              <a:off x="1600022" y="1071312"/>
+              <a:ext cx="6931753" cy="1147155"/>
+            </a:xfrm>
+            <a:prstGeom prst="bentConnector2">
+              <a:avLst/>
+            </a:prstGeom>
+            <a:ln w="12700">
+              <a:solidFill>
+                <a:schemeClr val="accent6"/>
+              </a:solidFill>
+              <a:tailEnd type="triangle"/>
+            </a:ln>
+          </p:spPr>
+          <p:style>
+            <a:lnRef idx="1">
+              <a:schemeClr val="accent1"/>
+            </a:lnRef>
+            <a:fillRef idx="0">
+              <a:schemeClr val="accent1"/>
+            </a:fillRef>
+            <a:effectRef idx="0">
+              <a:schemeClr val="accent1"/>
+            </a:effectRef>
+            <a:fontRef idx="minor">
+              <a:schemeClr val="tx1"/>
+            </a:fontRef>
+          </p:style>
+        </p:cxnSp>
+        <p:sp>
+          <p:nvSpPr>
+            <p:cNvPr id="94" name="TextBox 93"/>
+            <p:cNvSpPr txBox="1"/>
+            <p:nvPr/>
+          </p:nvSpPr>
+          <p:spPr>
+            <a:xfrm>
+              <a:off x="7235733" y="804642"/>
+              <a:ext cx="1231299" cy="307777"/>
+            </a:xfrm>
+            <a:prstGeom prst="rect">
+              <a:avLst/>
+            </a:prstGeom>
+            <a:noFill/>
+          </p:spPr>
+          <p:txBody>
+            <a:bodyPr wrap="none" rtlCol="0">
+              <a:spAutoFit/>
+            </a:bodyPr>
+            <a:lstStyle/>
+            <a:p>
+              <a:r>
+                <a:rPr lang="en-US" sz="1400" dirty="0" err="1" smtClean="0">
+                  <a:solidFill>
+                    <a:schemeClr val="accent6"/>
+                  </a:solidFill>
+                </a:rPr>
+                <a:t>sysCONFIG</a:t>
+              </a:r>
+              <a:r>
+                <a:rPr lang="en-US" sz="1400" dirty="0" smtClean="0">
+                  <a:solidFill>
+                    <a:schemeClr val="accent6"/>
+                  </a:solidFill>
+                </a:rPr>
+                <a:t> SPI</a:t>
+              </a:r>
+              <a:endParaRPr lang="en-US" sz="1400" dirty="0">
+                <a:solidFill>
+                  <a:schemeClr val="accent6"/>
+                </a:solidFill>
+              </a:endParaRPr>
+            </a:p>
+          </p:txBody>
+        </p:sp>
+        <p:sp>
+          <p:nvSpPr>
+            <p:cNvPr id="95" name="TextBox 94"/>
+            <p:cNvSpPr txBox="1"/>
+            <p:nvPr/>
+          </p:nvSpPr>
+          <p:spPr>
+            <a:xfrm>
+              <a:off x="3200345" y="1064756"/>
+              <a:ext cx="1231299" cy="307777"/>
+            </a:xfrm>
+            <a:prstGeom prst="rect">
+              <a:avLst/>
+            </a:prstGeom>
+            <a:noFill/>
+          </p:spPr>
+          <p:txBody>
+            <a:bodyPr wrap="none" rtlCol="0">
+              <a:spAutoFit/>
+            </a:bodyPr>
+            <a:lstStyle/>
+            <a:p>
+              <a:r>
+                <a:rPr lang="en-US" sz="1400" dirty="0" err="1" smtClean="0">
+                  <a:solidFill>
+                    <a:schemeClr val="accent6"/>
+                  </a:solidFill>
+                </a:rPr>
+                <a:t>sysCONFIG</a:t>
+              </a:r>
+              <a:r>
+                <a:rPr lang="en-US" sz="1400" dirty="0" smtClean="0">
+                  <a:solidFill>
+                    <a:schemeClr val="accent6"/>
+                  </a:solidFill>
+                </a:rPr>
+                <a:t> SPI</a:t>
+              </a:r>
+              <a:endParaRPr lang="en-US" sz="1400" dirty="0">
+                <a:solidFill>
+                  <a:schemeClr val="accent6"/>
+                </a:solidFill>
+              </a:endParaRPr>
+            </a:p>
+          </p:txBody>
+        </p:sp>
+        <p:sp>
+          <p:nvSpPr>
+            <p:cNvPr id="96" name="TextBox 95"/>
+            <p:cNvSpPr txBox="1"/>
+            <p:nvPr/>
+          </p:nvSpPr>
+          <p:spPr>
+            <a:xfrm>
+              <a:off x="1196123" y="1925696"/>
+              <a:ext cx="1231299" cy="307777"/>
+            </a:xfrm>
+            <a:prstGeom prst="rect">
+              <a:avLst/>
+            </a:prstGeom>
+            <a:noFill/>
+          </p:spPr>
+          <p:txBody>
+            <a:bodyPr wrap="none" rtlCol="0">
+              <a:spAutoFit/>
+            </a:bodyPr>
+            <a:lstStyle/>
+            <a:p>
+              <a:r>
+                <a:rPr lang="en-US" sz="1400" dirty="0" err="1" smtClean="0">
+                  <a:solidFill>
+                    <a:schemeClr val="accent6"/>
+                  </a:solidFill>
+                </a:rPr>
+                <a:t>sysCONFIG</a:t>
+              </a:r>
+              <a:r>
+                <a:rPr lang="en-US" sz="1400" dirty="0" smtClean="0">
+                  <a:solidFill>
+                    <a:schemeClr val="accent6"/>
+                  </a:solidFill>
+                </a:rPr>
+                <a:t> SPI</a:t>
+              </a:r>
+              <a:endParaRPr lang="en-US" sz="1400" dirty="0">
+                <a:solidFill>
+                  <a:schemeClr val="accent6"/>
+                </a:solidFill>
+              </a:endParaRPr>
+            </a:p>
+          </p:txBody>
+        </p:sp>
+        <p:sp>
+          <p:nvSpPr>
+            <p:cNvPr id="97" name="Rectangle 96"/>
+            <p:cNvSpPr/>
+            <p:nvPr/>
+          </p:nvSpPr>
+          <p:spPr>
+            <a:xfrm>
+              <a:off x="2122742" y="560471"/>
+              <a:ext cx="1077603" cy="356749"/>
+            </a:xfrm>
+            <a:prstGeom prst="rect">
+              <a:avLst/>
+            </a:prstGeom>
+            <a:solidFill>
+              <a:schemeClr val="bg1"/>
+            </a:solidFill>
+            <a:ln w="28575">
+              <a:solidFill>
+                <a:schemeClr val="accent6"/>
+              </a:solidFill>
+            </a:ln>
+          </p:spPr>
+          <p:style>
+            <a:lnRef idx="2">
+              <a:schemeClr val="accent1">
+                <a:shade val="50000"/>
+              </a:schemeClr>
+            </a:lnRef>
+            <a:fillRef idx="1">
+              <a:schemeClr val="accent1"/>
+            </a:fillRef>
+            <a:effectRef idx="0">
+              <a:schemeClr val="accent1"/>
+            </a:effectRef>
+            <a:fontRef idx="minor">
+              <a:schemeClr val="lt1"/>
+            </a:fontRef>
+          </p:style>
+          <p:txBody>
+            <a:bodyPr rtlCol="0" anchor="ctr"/>
+            <a:lstStyle/>
+            <a:p>
+              <a:pPr algn="ctr"/>
+              <a:r>
+                <a:rPr lang="en-US" dirty="0" smtClean="0">
+                  <a:solidFill>
+                    <a:schemeClr val="accent6"/>
+                  </a:solidFill>
+                </a:rPr>
+                <a:t>FLASH</a:t>
+              </a:r>
+              <a:endParaRPr lang="en-US" dirty="0">
+                <a:solidFill>
+                  <a:schemeClr val="accent6"/>
+                </a:solidFill>
+              </a:endParaRPr>
+            </a:p>
+          </p:txBody>
+        </p:sp>
+        <p:cxnSp>
+          <p:nvCxnSpPr>
+            <p:cNvPr id="99" name="Straight Arrow Connector 98"/>
+            <p:cNvCxnSpPr>
+              <a:endCxn id="97" idx="1"/>
+            </p:cNvCxnSpPr>
+            <p:nvPr/>
+          </p:nvCxnSpPr>
+          <p:spPr>
+            <a:xfrm>
+              <a:off x="1606551" y="738845"/>
+              <a:ext cx="516191" cy="1"/>
+            </a:xfrm>
+            <a:prstGeom prst="straightConnector1">
+              <a:avLst/>
+            </a:prstGeom>
+            <a:ln w="12700">
+              <a:solidFill>
+                <a:schemeClr val="accent6"/>
+              </a:solidFill>
+              <a:headEnd type="triangle"/>
+              <a:tailEnd type="triangle"/>
+            </a:ln>
+          </p:spPr>
+          <p:style>
+            <a:lnRef idx="1">
+              <a:schemeClr val="accent1"/>
+            </a:lnRef>
+            <a:fillRef idx="0">
+              <a:schemeClr val="accent1"/>
+            </a:fillRef>
+            <a:effectRef idx="0">
+              <a:schemeClr val="accent1"/>
+            </a:effectRef>
+            <a:fontRef idx="minor">
+              <a:schemeClr val="tx1"/>
+            </a:fontRef>
+          </p:style>
+        </p:cxnSp>
+        <p:sp>
+          <p:nvSpPr>
+            <p:cNvPr id="100" name="TextBox 99"/>
+            <p:cNvSpPr txBox="1"/>
+            <p:nvPr/>
+          </p:nvSpPr>
+          <p:spPr>
+            <a:xfrm>
+              <a:off x="1666779" y="489634"/>
+              <a:ext cx="404278" cy="307777"/>
+            </a:xfrm>
+            <a:prstGeom prst="rect">
+              <a:avLst/>
+            </a:prstGeom>
+            <a:noFill/>
+          </p:spPr>
+          <p:txBody>
+            <a:bodyPr wrap="none" rtlCol="0">
+              <a:spAutoFit/>
+            </a:bodyPr>
+            <a:lstStyle/>
+            <a:p>
+              <a:r>
+                <a:rPr lang="en-US" sz="1400" dirty="0" smtClean="0">
+                  <a:solidFill>
+                    <a:schemeClr val="accent6"/>
+                  </a:solidFill>
+                </a:rPr>
+                <a:t>SPI</a:t>
+              </a:r>
+              <a:endParaRPr lang="en-US" sz="1400" dirty="0">
+                <a:solidFill>
+                  <a:schemeClr val="accent6"/>
+                </a:solidFill>
+              </a:endParaRPr>
+            </a:p>
+          </p:txBody>
+        </p:sp>
+        <p:cxnSp>
+          <p:nvCxnSpPr>
+            <p:cNvPr id="113" name="Elbow Connector 112"/>
+            <p:cNvCxnSpPr>
+              <a:stCxn id="111" idx="2"/>
+              <a:endCxn id="102" idx="0"/>
+            </p:cNvCxnSpPr>
+            <p:nvPr/>
+          </p:nvCxnSpPr>
+          <p:spPr>
+            <a:xfrm rot="16200000" flipH="1">
+              <a:off x="1883961" y="918019"/>
+              <a:ext cx="800248" cy="1803659"/>
+            </a:xfrm>
+            <a:prstGeom prst="bentConnector3">
+              <a:avLst>
+                <a:gd name="adj1" fmla="val 54761"/>
+              </a:avLst>
+            </a:prstGeom>
+            <a:ln w="19050">
+              <a:solidFill>
+                <a:srgbClr val="11FF39"/>
+              </a:solidFill>
+            </a:ln>
+          </p:spPr>
+          <p:style>
+            <a:lnRef idx="1">
+              <a:schemeClr val="accent1"/>
+            </a:lnRef>
+            <a:fillRef idx="0">
+              <a:schemeClr val="accent1"/>
+            </a:fillRef>
+            <a:effectRef idx="0">
+              <a:schemeClr val="accent1"/>
+            </a:effectRef>
+            <a:fontRef idx="minor">
+              <a:schemeClr val="tx1"/>
+            </a:fontRef>
+          </p:style>
+        </p:cxnSp>
+        <p:cxnSp>
+          <p:nvCxnSpPr>
+            <p:cNvPr id="120" name="Elbow Connector 119"/>
+            <p:cNvCxnSpPr>
+              <a:endCxn id="103" idx="0"/>
+            </p:cNvCxnSpPr>
+            <p:nvPr/>
+          </p:nvCxnSpPr>
+          <p:spPr>
+            <a:xfrm>
+              <a:off x="3185915" y="1858404"/>
+              <a:ext cx="3597175" cy="361568"/>
+            </a:xfrm>
+            <a:prstGeom prst="bentConnector2">
+              <a:avLst/>
+            </a:prstGeom>
+            <a:ln w="19050">
+              <a:solidFill>
+                <a:srgbClr val="11FF39"/>
+              </a:solidFill>
+            </a:ln>
+          </p:spPr>
+          <p:style>
+            <a:lnRef idx="1">
+              <a:schemeClr val="accent1"/>
+            </a:lnRef>
+            <a:fillRef idx="0">
+              <a:schemeClr val="accent1"/>
+            </a:fillRef>
+            <a:effectRef idx="0">
+              <a:schemeClr val="accent1"/>
+            </a:effectRef>
+            <a:fontRef idx="minor">
+              <a:schemeClr val="tx1"/>
+            </a:fontRef>
+          </p:style>
+        </p:cxnSp>
+        <p:cxnSp>
+          <p:nvCxnSpPr>
+            <p:cNvPr id="125" name="Elbow Connector 124"/>
+            <p:cNvCxnSpPr>
+              <a:endCxn id="105" idx="0"/>
+            </p:cNvCxnSpPr>
+            <p:nvPr/>
+          </p:nvCxnSpPr>
+          <p:spPr>
+            <a:xfrm>
+              <a:off x="6783090" y="1858404"/>
+              <a:ext cx="3613499" cy="367534"/>
+            </a:xfrm>
+            <a:prstGeom prst="bentConnector2">
+              <a:avLst/>
+            </a:prstGeom>
+            <a:ln w="19050">
+              <a:solidFill>
+                <a:srgbClr val="11FF39"/>
+              </a:solidFill>
+            </a:ln>
+          </p:spPr>
+          <p:style>
+            <a:lnRef idx="1">
+              <a:schemeClr val="accent1"/>
+            </a:lnRef>
+            <a:fillRef idx="0">
+              <a:schemeClr val="accent1"/>
+            </a:fillRef>
+            <a:effectRef idx="0">
+              <a:schemeClr val="accent1"/>
+            </a:effectRef>
+            <a:fontRef idx="minor">
+              <a:schemeClr val="tx1"/>
+            </a:fontRef>
+          </p:style>
+        </p:cxnSp>
+        <p:sp>
+          <p:nvSpPr>
+            <p:cNvPr id="134" name="TextBox 133"/>
+            <p:cNvSpPr txBox="1"/>
+            <p:nvPr/>
+          </p:nvSpPr>
+          <p:spPr>
+            <a:xfrm>
+              <a:off x="5224397" y="1597742"/>
+              <a:ext cx="984565" cy="307777"/>
+            </a:xfrm>
+            <a:prstGeom prst="rect">
+              <a:avLst/>
+            </a:prstGeom>
+            <a:noFill/>
+          </p:spPr>
+          <p:txBody>
+            <a:bodyPr wrap="none" rtlCol="0">
+              <a:spAutoFit/>
+            </a:bodyPr>
+            <a:lstStyle/>
+            <a:p>
+              <a:r>
+                <a:rPr lang="en-US" sz="1400" dirty="0" smtClean="0">
+                  <a:solidFill>
+                    <a:srgbClr val="11FF39"/>
+                  </a:solidFill>
+                </a:rPr>
+                <a:t>GPMC    23</a:t>
+              </a:r>
+              <a:endParaRPr lang="en-US" sz="1400" dirty="0">
+                <a:solidFill>
+                  <a:srgbClr val="11FF39"/>
+                </a:solidFill>
+              </a:endParaRPr>
+            </a:p>
+          </p:txBody>
+        </p:sp>
+        <p:cxnSp>
+          <p:nvCxnSpPr>
+            <p:cNvPr id="135" name="Straight Connector 134"/>
+            <p:cNvCxnSpPr/>
+            <p:nvPr/>
+          </p:nvCxnSpPr>
+          <p:spPr>
+            <a:xfrm flipV="1">
+              <a:off x="5786022" y="1806779"/>
+              <a:ext cx="88901" cy="88901"/>
+            </a:xfrm>
+            <a:prstGeom prst="line">
+              <a:avLst/>
+            </a:prstGeom>
+            <a:ln>
+              <a:solidFill>
+                <a:srgbClr val="11FF39"/>
+              </a:solidFill>
+            </a:ln>
+          </p:spPr>
+          <p:style>
+            <a:lnRef idx="1">
+              <a:schemeClr val="accent1"/>
+            </a:lnRef>
+            <a:fillRef idx="0">
+              <a:schemeClr val="accent1"/>
+            </a:fillRef>
+            <a:effectRef idx="0">
+              <a:schemeClr val="accent1"/>
+            </a:effectRef>
+            <a:fontRef idx="minor">
+              <a:schemeClr val="tx1"/>
+            </a:fontRef>
+          </p:style>
+        </p:cxnSp>
+        <p:sp>
+          <p:nvSpPr>
+            <p:cNvPr id="136" name="Rectangle 135"/>
+            <p:cNvSpPr/>
+            <p:nvPr/>
+          </p:nvSpPr>
+          <p:spPr>
+            <a:xfrm rot="16200000">
+              <a:off x="8589132" y="657219"/>
+              <a:ext cx="895305" cy="380965"/>
+            </a:xfrm>
+            <a:prstGeom prst="rect">
+              <a:avLst/>
+            </a:prstGeom>
+            <a:solidFill>
+              <a:schemeClr val="bg1"/>
+            </a:solidFill>
+            <a:ln w="28575">
+              <a:solidFill>
+                <a:srgbClr val="C00000"/>
+              </a:solidFill>
+            </a:ln>
+          </p:spPr>
+          <p:style>
+            <a:lnRef idx="2">
+              <a:schemeClr val="accent1">
+                <a:shade val="50000"/>
+              </a:schemeClr>
+            </a:lnRef>
+            <a:fillRef idx="1">
+              <a:schemeClr val="accent1"/>
+            </a:fillRef>
+            <a:effectRef idx="0">
+              <a:schemeClr val="accent1"/>
+            </a:effectRef>
+            <a:fontRef idx="minor">
+              <a:schemeClr val="lt1"/>
+            </a:fontRef>
+          </p:style>
+          <p:txBody>
+            <a:bodyPr rtlCol="0" anchor="ctr"/>
+            <a:lstStyle/>
+            <a:p>
+              <a:pPr algn="ctr"/>
+              <a:r>
+                <a:rPr lang="en-US" dirty="0" smtClean="0">
+                  <a:solidFill>
+                    <a:srgbClr val="C00000"/>
+                  </a:solidFill>
+                </a:rPr>
+                <a:t>SDRAM</a:t>
+              </a:r>
+              <a:endParaRPr lang="en-US" dirty="0">
+                <a:solidFill>
+                  <a:srgbClr val="C00000"/>
+                </a:solidFill>
+              </a:endParaRPr>
+            </a:p>
+          </p:txBody>
+        </p:sp>
+        <p:sp>
+          <p:nvSpPr>
+            <p:cNvPr id="137" name="Rectangle 136"/>
+            <p:cNvSpPr/>
+            <p:nvPr/>
+          </p:nvSpPr>
+          <p:spPr>
+            <a:xfrm rot="16200000">
+              <a:off x="9406839" y="497736"/>
+              <a:ext cx="895306" cy="699932"/>
+            </a:xfrm>
+            <a:prstGeom prst="rect">
+              <a:avLst/>
+            </a:prstGeom>
+            <a:solidFill>
+              <a:schemeClr val="bg1"/>
+            </a:solidFill>
+            <a:ln w="28575">
+              <a:solidFill>
+                <a:srgbClr val="C00000"/>
+              </a:solidFill>
+            </a:ln>
+          </p:spPr>
+          <p:style>
+            <a:lnRef idx="2">
+              <a:schemeClr val="accent1">
+                <a:shade val="50000"/>
+              </a:schemeClr>
+            </a:lnRef>
+            <a:fillRef idx="1">
+              <a:schemeClr val="accent1"/>
+            </a:fillRef>
+            <a:effectRef idx="0">
+              <a:schemeClr val="accent1"/>
+            </a:effectRef>
+            <a:fontRef idx="minor">
+              <a:schemeClr val="lt1"/>
+            </a:fontRef>
+          </p:style>
+          <p:txBody>
+            <a:bodyPr rtlCol="0" anchor="ctr"/>
+            <a:lstStyle/>
+            <a:p>
+              <a:pPr algn="ctr"/>
+              <a:r>
+                <a:rPr lang="en-US" dirty="0" smtClean="0">
+                  <a:solidFill>
+                    <a:srgbClr val="C00000"/>
+                  </a:solidFill>
+                </a:rPr>
+                <a:t>ENET</a:t>
+              </a:r>
+            </a:p>
+            <a:p>
+              <a:pPr algn="ctr"/>
+              <a:r>
+                <a:rPr lang="en-US" dirty="0" smtClean="0">
+                  <a:solidFill>
+                    <a:srgbClr val="C00000"/>
+                  </a:solidFill>
+                </a:rPr>
+                <a:t>PHY</a:t>
+              </a:r>
+              <a:endParaRPr lang="en-US" dirty="0">
+                <a:solidFill>
+                  <a:srgbClr val="C00000"/>
+                </a:solidFill>
+              </a:endParaRPr>
+            </a:p>
+          </p:txBody>
+        </p:sp>
+        <p:cxnSp>
+          <p:nvCxnSpPr>
+            <p:cNvPr id="170" name="Elbow Connector 169"/>
+            <p:cNvCxnSpPr>
+              <a:endCxn id="126" idx="0"/>
+            </p:cNvCxnSpPr>
+            <p:nvPr/>
+          </p:nvCxnSpPr>
+          <p:spPr>
+            <a:xfrm rot="16200000" flipH="1">
+              <a:off x="9641825" y="2613167"/>
+              <a:ext cx="2524765" cy="1015237"/>
+            </a:xfrm>
+            <a:prstGeom prst="bentConnector3">
+              <a:avLst>
+                <a:gd name="adj1" fmla="val -18"/>
+              </a:avLst>
+            </a:prstGeom>
+            <a:ln w="19050">
+              <a:solidFill>
+                <a:srgbClr val="11FF39"/>
+              </a:solidFill>
+            </a:ln>
+          </p:spPr>
+          <p:style>
+            <a:lnRef idx="1">
+              <a:schemeClr val="accent1"/>
+            </a:lnRef>
+            <a:fillRef idx="0">
+              <a:schemeClr val="accent1"/>
+            </a:fillRef>
+            <a:effectRef idx="0">
+              <a:schemeClr val="accent1"/>
+            </a:effectRef>
+            <a:fontRef idx="minor">
+              <a:schemeClr val="tx1"/>
+            </a:fontRef>
+          </p:style>
+        </p:cxnSp>
+        <p:cxnSp>
+          <p:nvCxnSpPr>
+            <p:cNvPr id="185" name="Straight Arrow Connector 184"/>
+            <p:cNvCxnSpPr>
+              <a:stCxn id="136" idx="1"/>
+              <a:endCxn id="163" idx="0"/>
+            </p:cNvCxnSpPr>
+            <p:nvPr/>
+          </p:nvCxnSpPr>
+          <p:spPr>
+            <a:xfrm flipH="1">
+              <a:off x="9036784" y="1295354"/>
+              <a:ext cx="1" cy="930583"/>
+            </a:xfrm>
+            <a:prstGeom prst="straightConnector1">
+              <a:avLst/>
+            </a:prstGeom>
+            <a:ln w="57150">
+              <a:solidFill>
+                <a:srgbClr val="C00000"/>
+              </a:solidFill>
+              <a:headEnd type="triangle"/>
+              <a:tailEnd type="triangle"/>
+            </a:ln>
+          </p:spPr>
+          <p:style>
+            <a:lnRef idx="1">
+              <a:schemeClr val="accent1"/>
+            </a:lnRef>
+            <a:fillRef idx="0">
+              <a:schemeClr val="accent1"/>
+            </a:fillRef>
+            <a:effectRef idx="0">
+              <a:schemeClr val="accent1"/>
+            </a:effectRef>
+            <a:fontRef idx="minor">
+              <a:schemeClr val="tx1"/>
+            </a:fontRef>
+          </p:style>
+        </p:cxnSp>
+        <p:sp>
+          <p:nvSpPr>
+            <p:cNvPr id="186" name="TextBox 185"/>
+            <p:cNvSpPr txBox="1"/>
+            <p:nvPr/>
+          </p:nvSpPr>
+          <p:spPr>
+            <a:xfrm rot="16200000">
+              <a:off x="8553198" y="1411725"/>
+              <a:ext cx="595035" cy="307777"/>
+            </a:xfrm>
+            <a:prstGeom prst="rect">
+              <a:avLst/>
+            </a:prstGeom>
+            <a:noFill/>
+          </p:spPr>
+          <p:txBody>
+            <a:bodyPr wrap="none" rtlCol="0">
+              <a:spAutoFit/>
+            </a:bodyPr>
+            <a:lstStyle/>
+            <a:p>
+              <a:r>
+                <a:rPr lang="en-US" sz="1400" dirty="0" smtClean="0">
+                  <a:solidFill>
+                    <a:srgbClr val="C00000"/>
+                  </a:solidFill>
+                </a:rPr>
+                <a:t>DDR3</a:t>
+              </a:r>
+              <a:endParaRPr lang="en-US" sz="1400" dirty="0">
+                <a:solidFill>
+                  <a:srgbClr val="C00000"/>
+                </a:solidFill>
+              </a:endParaRPr>
+            </a:p>
+          </p:txBody>
+        </p:sp>
+        <p:cxnSp>
+          <p:nvCxnSpPr>
+            <p:cNvPr id="191" name="Straight Arrow Connector 190"/>
+            <p:cNvCxnSpPr>
+              <a:stCxn id="188" idx="2"/>
+              <a:endCxn id="164" idx="0"/>
+            </p:cNvCxnSpPr>
+            <p:nvPr/>
+          </p:nvCxnSpPr>
+          <p:spPr>
+            <a:xfrm flipH="1">
+              <a:off x="9689576" y="1298243"/>
+              <a:ext cx="620" cy="930297"/>
+            </a:xfrm>
+            <a:prstGeom prst="straightConnector1">
+              <a:avLst/>
+            </a:prstGeom>
+            <a:ln w="57150">
+              <a:solidFill>
+                <a:srgbClr val="C00000"/>
+              </a:solidFill>
+              <a:headEnd type="triangle"/>
+              <a:tailEnd type="triangle"/>
+            </a:ln>
+          </p:spPr>
+          <p:style>
+            <a:lnRef idx="1">
+              <a:schemeClr val="accent1"/>
+            </a:lnRef>
+            <a:fillRef idx="0">
+              <a:schemeClr val="accent1"/>
+            </a:fillRef>
+            <a:effectRef idx="0">
+              <a:schemeClr val="accent1"/>
+            </a:effectRef>
+            <a:fontRef idx="minor">
+              <a:schemeClr val="tx1"/>
+            </a:fontRef>
+          </p:style>
+        </p:cxnSp>
+        <p:cxnSp>
+          <p:nvCxnSpPr>
+            <p:cNvPr id="194" name="Straight Arrow Connector 193"/>
+            <p:cNvCxnSpPr>
+              <a:stCxn id="189" idx="2"/>
+              <a:endCxn id="165" idx="0"/>
+            </p:cNvCxnSpPr>
+            <p:nvPr/>
+          </p:nvCxnSpPr>
+          <p:spPr>
+            <a:xfrm>
+              <a:off x="10008730" y="1300011"/>
+              <a:ext cx="0" cy="932277"/>
+            </a:xfrm>
+            <a:prstGeom prst="straightConnector1">
+              <a:avLst/>
+            </a:prstGeom>
+            <a:ln w="19050">
+              <a:solidFill>
+                <a:srgbClr val="C00000"/>
+              </a:solidFill>
+              <a:headEnd type="triangle"/>
+              <a:tailEnd type="triangle"/>
+            </a:ln>
+          </p:spPr>
+          <p:style>
+            <a:lnRef idx="1">
+              <a:schemeClr val="accent1"/>
+            </a:lnRef>
+            <a:fillRef idx="0">
+              <a:schemeClr val="accent1"/>
+            </a:fillRef>
+            <a:effectRef idx="0">
+              <a:schemeClr val="accent1"/>
+            </a:effectRef>
+            <a:fontRef idx="minor">
+              <a:schemeClr val="tx1"/>
+            </a:fontRef>
+          </p:style>
+        </p:cxnSp>
+        <p:sp>
+          <p:nvSpPr>
+            <p:cNvPr id="196" name="TextBox 195"/>
+            <p:cNvSpPr txBox="1"/>
+            <p:nvPr/>
+          </p:nvSpPr>
+          <p:spPr>
+            <a:xfrm rot="16200000">
+              <a:off x="9180977" y="1429227"/>
+              <a:ext cx="638252" cy="307777"/>
+            </a:xfrm>
+            <a:prstGeom prst="rect">
+              <a:avLst/>
+            </a:prstGeom>
+            <a:noFill/>
+          </p:spPr>
+          <p:txBody>
+            <a:bodyPr wrap="none" rtlCol="0">
+              <a:spAutoFit/>
+            </a:bodyPr>
+            <a:lstStyle/>
+            <a:p>
+              <a:r>
+                <a:rPr lang="en-US" sz="1400" dirty="0" smtClean="0">
+                  <a:solidFill>
+                    <a:srgbClr val="C00000"/>
+                  </a:solidFill>
+                </a:rPr>
+                <a:t>RGMII</a:t>
+              </a:r>
+              <a:endParaRPr lang="en-US" sz="1400" dirty="0">
+                <a:solidFill>
+                  <a:srgbClr val="C00000"/>
+                </a:solidFill>
+              </a:endParaRPr>
+            </a:p>
+          </p:txBody>
+        </p:sp>
+        <p:sp>
+          <p:nvSpPr>
+            <p:cNvPr id="197" name="TextBox 196"/>
+            <p:cNvSpPr txBox="1"/>
+            <p:nvPr/>
+          </p:nvSpPr>
+          <p:spPr>
+            <a:xfrm rot="16200000">
+              <a:off x="9584029" y="1427647"/>
+              <a:ext cx="612668" cy="307777"/>
+            </a:xfrm>
+            <a:prstGeom prst="rect">
+              <a:avLst/>
+            </a:prstGeom>
+            <a:noFill/>
+          </p:spPr>
+          <p:txBody>
+            <a:bodyPr wrap="none" rtlCol="0">
+              <a:spAutoFit/>
+            </a:bodyPr>
+            <a:lstStyle/>
+            <a:p>
+              <a:r>
+                <a:rPr lang="en-US" sz="1400" dirty="0" smtClean="0">
+                  <a:solidFill>
+                    <a:srgbClr val="C00000"/>
+                  </a:solidFill>
+                </a:rPr>
+                <a:t>MDIO</a:t>
+              </a:r>
+              <a:endParaRPr lang="en-US" sz="1400" dirty="0">
+                <a:solidFill>
+                  <a:srgbClr val="C00000"/>
+                </a:solidFill>
+              </a:endParaRPr>
+            </a:p>
+          </p:txBody>
+        </p:sp>
+      </p:grpSp>
+      <p:sp>
+        <p:nvSpPr>
+          <p:cNvPr id="199" name="Rectangle 198"/>
+          <p:cNvSpPr/>
+          <p:nvPr/>
+        </p:nvSpPr>
+        <p:spPr>
+          <a:xfrm>
+            <a:off x="11884901" y="6618369"/>
+            <a:ext cx="82550" cy="93579"/>
+          </a:xfrm>
+          <a:prstGeom prst="rect">
+            <a:avLst/>
+          </a:prstGeom>
+        </p:spPr>
+        <p:style>
+          <a:lnRef idx="2">
+            <a:schemeClr val="accent1">
+              <a:shade val="50000"/>
+            </a:schemeClr>
+          </a:lnRef>
+          <a:fillRef idx="1">
+            <a:schemeClr val="accent1"/>
+          </a:fillRef>
+          <a:effectRef idx="0">
+            <a:schemeClr val="accent1"/>
+          </a:effectRef>
+          <a:fontRef idx="minor">
+            <a:schemeClr val="lt1"/>
+          </a:fontRef>
+        </p:style>
+        <p:txBody>
+          <a:bodyPr rtlCol="0" anchor="ctr"/>
+          <a:lstStyle/>
+          <a:p>
+            <a:pPr algn="ctr"/>
+            <a:endParaRPr lang="en-US"/>
+          </a:p>
+        </p:txBody>
+      </p:sp>
+      <p:cxnSp>
+        <p:nvCxnSpPr>
+          <p:cNvPr id="203" name="Straight Connector 202"/>
+          <p:cNvCxnSpPr/>
+          <p:nvPr/>
+        </p:nvCxnSpPr>
+        <p:spPr>
+          <a:xfrm>
+            <a:off x="0" y="5194300"/>
+            <a:ext cx="12192000" cy="0"/>
+          </a:xfrm>
+          <a:prstGeom prst="line">
+            <a:avLst/>
+          </a:prstGeom>
+          <a:ln w="12700">
+            <a:solidFill>
+              <a:schemeClr val="tx1"/>
+            </a:solidFill>
+            <a:prstDash val="lgDash"/>
+          </a:ln>
+        </p:spPr>
+        <p:style>
+          <a:lnRef idx="1">
+            <a:schemeClr val="accent1"/>
+          </a:lnRef>
+          <a:fillRef idx="0">
+            <a:schemeClr val="accent1"/>
+          </a:fillRef>
+          <a:effectRef idx="0">
+            <a:schemeClr val="accent1"/>
+          </a:effectRef>
+          <a:fontRef idx="minor">
+            <a:schemeClr val="tx1"/>
+          </a:fontRef>
+        </p:style>
+      </p:cxnSp>
+      <p:sp>
+        <p:nvSpPr>
+          <p:cNvPr id="204" name="Rectangle 203"/>
+          <p:cNvSpPr/>
+          <p:nvPr/>
+        </p:nvSpPr>
+        <p:spPr>
+          <a:xfrm>
+            <a:off x="404404" y="5303613"/>
+            <a:ext cx="5378147" cy="442829"/>
+          </a:xfrm>
+          <a:prstGeom prst="rect">
+            <a:avLst/>
+          </a:prstGeom>
+          <a:solidFill>
+            <a:schemeClr val="bg1"/>
+          </a:solidFill>
+          <a:ln w="28575">
+            <a:solidFill>
+              <a:schemeClr val="accent1"/>
+            </a:solidFill>
+          </a:ln>
+        </p:spPr>
+        <p:style>
+          <a:lnRef idx="2">
+            <a:schemeClr val="accent1">
+              <a:shade val="50000"/>
+            </a:schemeClr>
+          </a:lnRef>
+          <a:fillRef idx="1">
+            <a:schemeClr val="accent1"/>
+          </a:fillRef>
+          <a:effectRef idx="0">
+            <a:schemeClr val="accent1"/>
+          </a:effectRef>
+          <a:fontRef idx="minor">
+            <a:schemeClr val="lt1"/>
+          </a:fontRef>
+        </p:style>
+        <p:txBody>
+          <a:bodyPr rtlCol="0" anchor="ctr"/>
+          <a:lstStyle/>
+          <a:p>
+            <a:pPr algn="ctr"/>
+            <a:r>
+              <a:rPr lang="en-US" dirty="0" smtClean="0">
+                <a:solidFill>
+                  <a:schemeClr val="accent1"/>
+                </a:solidFill>
+              </a:rPr>
+              <a:t>GRAVITON JUMPER CONNECTOR J4</a:t>
+            </a:r>
+            <a:endParaRPr lang="en-US" dirty="0">
+              <a:solidFill>
+                <a:schemeClr val="accent1"/>
+              </a:solidFill>
+            </a:endParaRPr>
+          </a:p>
+        </p:txBody>
+      </p:sp>
+      <p:sp>
+        <p:nvSpPr>
+          <p:cNvPr id="205" name="Rectangle 204"/>
+          <p:cNvSpPr/>
+          <p:nvPr/>
+        </p:nvSpPr>
+        <p:spPr>
+          <a:xfrm>
+            <a:off x="6505815" y="5299575"/>
+            <a:ext cx="5378147" cy="442829"/>
+          </a:xfrm>
+          <a:prstGeom prst="rect">
+            <a:avLst/>
+          </a:prstGeom>
+          <a:solidFill>
+            <a:schemeClr val="bg1"/>
+          </a:solidFill>
+          <a:ln w="28575">
+            <a:solidFill>
+              <a:schemeClr val="accent1"/>
+            </a:solidFill>
+          </a:ln>
+        </p:spPr>
+        <p:style>
+          <a:lnRef idx="2">
+            <a:schemeClr val="accent1">
+              <a:shade val="50000"/>
+            </a:schemeClr>
+          </a:lnRef>
+          <a:fillRef idx="1">
+            <a:schemeClr val="accent1"/>
+          </a:fillRef>
+          <a:effectRef idx="0">
+            <a:schemeClr val="accent1"/>
+          </a:effectRef>
+          <a:fontRef idx="minor">
+            <a:schemeClr val="lt1"/>
+          </a:fontRef>
+        </p:style>
+        <p:txBody>
+          <a:bodyPr rtlCol="0" anchor="ctr"/>
+          <a:lstStyle/>
+          <a:p>
+            <a:pPr algn="ctr"/>
+            <a:r>
+              <a:rPr lang="en-US" dirty="0" smtClean="0">
+                <a:solidFill>
+                  <a:schemeClr val="accent1"/>
+                </a:solidFill>
+              </a:rPr>
+              <a:t>GRAVITON JUMPER CONNECTOR J3</a:t>
+            </a:r>
+            <a:endParaRPr lang="en-US" dirty="0">
+              <a:solidFill>
+                <a:schemeClr val="accent1"/>
+              </a:solidFill>
+            </a:endParaRPr>
+          </a:p>
+        </p:txBody>
+      </p:sp>
+    </p:spTree>
+    <p:extLst>
+      <p:ext uri="{BB962C8B-B14F-4D97-AF65-F5344CB8AC3E}">
+        <p14:creationId xmlns:p14="http://schemas.microsoft.com/office/powerpoint/2010/main" val="4037717442"/>
       </p:ext>
     </p:extLst>
   </p:cSld>

</xml_diff>

<commit_message>
added plots for PLL divider settings to manual
</commit_message>
<xml_diff>
--- a/docs/User Guide Block Diagrams.pptx
+++ b/docs/User Guide Block Diagrams.pptx
@@ -12371,7 +12371,7 @@
       </p:grpSpPr>
       <p:grpSp>
         <p:nvGrpSpPr>
-          <p:cNvPr id="73" name="Group 72"/>
+          <p:cNvPr id="88" name="Group 87"/>
           <p:cNvGrpSpPr/>
           <p:nvPr/>
         </p:nvGrpSpPr>
@@ -14525,6 +14525,228 @@
             </a:fontRef>
           </p:style>
         </p:cxnSp>
+        <p:cxnSp>
+          <p:nvCxnSpPr>
+            <p:cNvPr id="77" name="Straight Connector 76"/>
+            <p:cNvCxnSpPr>
+              <a:stCxn id="8" idx="1"/>
+            </p:cNvCxnSpPr>
+            <p:nvPr/>
+          </p:nvCxnSpPr>
+          <p:spPr>
+            <a:xfrm flipH="1">
+              <a:off x="3598069" y="2227266"/>
+              <a:ext cx="265179" cy="0"/>
+            </a:xfrm>
+            <a:prstGeom prst="line">
+              <a:avLst/>
+            </a:prstGeom>
+            <a:ln w="28575">
+              <a:solidFill>
+                <a:schemeClr val="tx1"/>
+              </a:solidFill>
+            </a:ln>
+          </p:spPr>
+          <p:style>
+            <a:lnRef idx="1">
+              <a:schemeClr val="accent1"/>
+            </a:lnRef>
+            <a:fillRef idx="0">
+              <a:schemeClr val="accent1"/>
+            </a:fillRef>
+            <a:effectRef idx="0">
+              <a:schemeClr val="accent1"/>
+            </a:effectRef>
+            <a:fontRef idx="minor">
+              <a:schemeClr val="tx1"/>
+            </a:fontRef>
+          </p:style>
+        </p:cxnSp>
+        <p:cxnSp>
+          <p:nvCxnSpPr>
+            <p:cNvPr id="79" name="Straight Connector 78"/>
+            <p:cNvCxnSpPr>
+              <a:stCxn id="9" idx="1"/>
+            </p:cNvCxnSpPr>
+            <p:nvPr/>
+          </p:nvCxnSpPr>
+          <p:spPr>
+            <a:xfrm flipH="1">
+              <a:off x="3598069" y="2982923"/>
+              <a:ext cx="265179" cy="0"/>
+            </a:xfrm>
+            <a:prstGeom prst="line">
+              <a:avLst/>
+            </a:prstGeom>
+            <a:ln w="28575">
+              <a:solidFill>
+                <a:schemeClr val="tx1"/>
+              </a:solidFill>
+            </a:ln>
+          </p:spPr>
+          <p:style>
+            <a:lnRef idx="1">
+              <a:schemeClr val="accent1"/>
+            </a:lnRef>
+            <a:fillRef idx="0">
+              <a:schemeClr val="accent1"/>
+            </a:fillRef>
+            <a:effectRef idx="0">
+              <a:schemeClr val="accent1"/>
+            </a:effectRef>
+            <a:fontRef idx="minor">
+              <a:schemeClr val="tx1"/>
+            </a:fontRef>
+          </p:style>
+        </p:cxnSp>
+        <p:cxnSp>
+          <p:nvCxnSpPr>
+            <p:cNvPr id="81" name="Straight Connector 80"/>
+            <p:cNvCxnSpPr>
+              <a:stCxn id="10" idx="1"/>
+            </p:cNvCxnSpPr>
+            <p:nvPr/>
+          </p:nvCxnSpPr>
+          <p:spPr>
+            <a:xfrm flipH="1">
+              <a:off x="3598069" y="3738580"/>
+              <a:ext cx="254427" cy="0"/>
+            </a:xfrm>
+            <a:prstGeom prst="line">
+              <a:avLst/>
+            </a:prstGeom>
+            <a:ln w="28575">
+              <a:solidFill>
+                <a:schemeClr val="tx1"/>
+              </a:solidFill>
+            </a:ln>
+          </p:spPr>
+          <p:style>
+            <a:lnRef idx="1">
+              <a:schemeClr val="accent1"/>
+            </a:lnRef>
+            <a:fillRef idx="0">
+              <a:schemeClr val="accent1"/>
+            </a:fillRef>
+            <a:effectRef idx="0">
+              <a:schemeClr val="accent1"/>
+            </a:effectRef>
+            <a:fontRef idx="minor">
+              <a:schemeClr val="tx1"/>
+            </a:fontRef>
+          </p:style>
+        </p:cxnSp>
+        <p:cxnSp>
+          <p:nvCxnSpPr>
+            <p:cNvPr id="83" name="Straight Connector 82"/>
+            <p:cNvCxnSpPr>
+              <a:stCxn id="11" idx="1"/>
+            </p:cNvCxnSpPr>
+            <p:nvPr/>
+          </p:nvCxnSpPr>
+          <p:spPr>
+            <a:xfrm flipH="1">
+              <a:off x="3598069" y="4494237"/>
+              <a:ext cx="254426" cy="0"/>
+            </a:xfrm>
+            <a:prstGeom prst="line">
+              <a:avLst/>
+            </a:prstGeom>
+            <a:ln w="28575">
+              <a:solidFill>
+                <a:schemeClr val="tx1"/>
+              </a:solidFill>
+            </a:ln>
+          </p:spPr>
+          <p:style>
+            <a:lnRef idx="1">
+              <a:schemeClr val="accent1"/>
+            </a:lnRef>
+            <a:fillRef idx="0">
+              <a:schemeClr val="accent1"/>
+            </a:fillRef>
+            <a:effectRef idx="0">
+              <a:schemeClr val="accent1"/>
+            </a:effectRef>
+            <a:fontRef idx="minor">
+              <a:schemeClr val="tx1"/>
+            </a:fontRef>
+          </p:style>
+        </p:cxnSp>
+        <p:cxnSp>
+          <p:nvCxnSpPr>
+            <p:cNvPr id="85" name="Straight Connector 84"/>
+            <p:cNvCxnSpPr>
+              <a:stCxn id="12" idx="1"/>
+            </p:cNvCxnSpPr>
+            <p:nvPr/>
+          </p:nvCxnSpPr>
+          <p:spPr>
+            <a:xfrm flipH="1">
+              <a:off x="3598069" y="5249894"/>
+              <a:ext cx="246804" cy="0"/>
+            </a:xfrm>
+            <a:prstGeom prst="line">
+              <a:avLst/>
+            </a:prstGeom>
+            <a:ln w="28575">
+              <a:solidFill>
+                <a:schemeClr val="tx1"/>
+              </a:solidFill>
+            </a:ln>
+          </p:spPr>
+          <p:style>
+            <a:lnRef idx="1">
+              <a:schemeClr val="accent1"/>
+            </a:lnRef>
+            <a:fillRef idx="0">
+              <a:schemeClr val="accent1"/>
+            </a:fillRef>
+            <a:effectRef idx="0">
+              <a:schemeClr val="accent1"/>
+            </a:effectRef>
+            <a:fontRef idx="minor">
+              <a:schemeClr val="tx1"/>
+            </a:fontRef>
+          </p:style>
+        </p:cxnSp>
+        <p:cxnSp>
+          <p:nvCxnSpPr>
+            <p:cNvPr id="87" name="Straight Connector 86"/>
+            <p:cNvCxnSpPr>
+              <a:stCxn id="7" idx="1"/>
+            </p:cNvCxnSpPr>
+            <p:nvPr/>
+          </p:nvCxnSpPr>
+          <p:spPr>
+            <a:xfrm flipH="1">
+              <a:off x="3598069" y="1471609"/>
+              <a:ext cx="265180" cy="0"/>
+            </a:xfrm>
+            <a:prstGeom prst="line">
+              <a:avLst/>
+            </a:prstGeom>
+            <a:ln w="28575">
+              <a:solidFill>
+                <a:schemeClr val="tx1"/>
+              </a:solidFill>
+            </a:ln>
+          </p:spPr>
+          <p:style>
+            <a:lnRef idx="1">
+              <a:schemeClr val="accent1"/>
+            </a:lnRef>
+            <a:fillRef idx="0">
+              <a:schemeClr val="accent1"/>
+            </a:fillRef>
+            <a:effectRef idx="0">
+              <a:schemeClr val="accent1"/>
+            </a:effectRef>
+            <a:fontRef idx="minor">
+              <a:schemeClr val="tx1"/>
+            </a:fontRef>
+          </p:style>
+        </p:cxnSp>
       </p:grpSp>
     </p:spTree>
     <p:extLst>

</xml_diff>